<commit_message>
Temporary rollback of EmployeeHome for presentation purposes. ViewGoal DateTimes pretty printed.
</commit_message>
<xml_diff>
--- a/Resources/csci-4712-week13.pptx
+++ b/Resources/csci-4712-week13.pptx
@@ -9,7 +9,7 @@
     <p:sldMasterId id="2147483678" r:id="rId5"/>
   </p:sldMasterIdLst>
   <p:notesMasterIdLst>
-    <p:notesMasterId r:id="rId24"/>
+    <p:notesMasterId r:id="rId26"/>
   </p:notesMasterIdLst>
   <p:sldIdLst>
     <p:sldId id="262" r:id="rId6"/>
@@ -19,17 +19,19 @@
     <p:sldId id="322" r:id="rId10"/>
     <p:sldId id="324" r:id="rId11"/>
     <p:sldId id="325" r:id="rId12"/>
-    <p:sldId id="330" r:id="rId13"/>
-    <p:sldId id="331" r:id="rId14"/>
-    <p:sldId id="336" r:id="rId15"/>
-    <p:sldId id="332" r:id="rId16"/>
-    <p:sldId id="337" r:id="rId17"/>
-    <p:sldId id="328" r:id="rId18"/>
-    <p:sldId id="333" r:id="rId19"/>
-    <p:sldId id="334" r:id="rId20"/>
-    <p:sldId id="335" r:id="rId21"/>
-    <p:sldId id="338" r:id="rId22"/>
-    <p:sldId id="339" r:id="rId23"/>
+    <p:sldId id="341" r:id="rId13"/>
+    <p:sldId id="330" r:id="rId14"/>
+    <p:sldId id="331" r:id="rId15"/>
+    <p:sldId id="336" r:id="rId16"/>
+    <p:sldId id="332" r:id="rId17"/>
+    <p:sldId id="337" r:id="rId18"/>
+    <p:sldId id="328" r:id="rId19"/>
+    <p:sldId id="333" r:id="rId20"/>
+    <p:sldId id="340" r:id="rId21"/>
+    <p:sldId id="334" r:id="rId22"/>
+    <p:sldId id="335" r:id="rId23"/>
+    <p:sldId id="338" r:id="rId24"/>
+    <p:sldId id="339" r:id="rId25"/>
   </p:sldIdLst>
   <p:sldSz cx="12192000" cy="6858000"/>
   <p:notesSz cx="6881813" cy="9296400"/>
@@ -550,7 +552,7 @@
           <a:p>
             <a:fld id="{8829343C-F7D9-4397-99EF-3FCA01B9EDB7}" type="slidenum">
               <a:rPr lang="en-US" smtClean="0"/>
-              <a:t>14</a:t>
+              <a:t>15</a:t>
             </a:fld>
             <a:endParaRPr lang="en-US"/>
           </a:p>
@@ -634,7 +636,7 @@
           <a:p>
             <a:fld id="{8829343C-F7D9-4397-99EF-3FCA01B9EDB7}" type="slidenum">
               <a:rPr lang="en-US" smtClean="0"/>
-              <a:t>15</a:t>
+              <a:t>16</a:t>
             </a:fld>
             <a:endParaRPr lang="en-US"/>
           </a:p>
@@ -643,7 +645,7 @@
     </p:spTree>
     <p:extLst>
       <p:ext uri="{BB962C8B-B14F-4D97-AF65-F5344CB8AC3E}">
-        <p14:creationId xmlns:p14="http://schemas.microsoft.com/office/powerpoint/2010/main" val="1836782914"/>
+        <p14:creationId xmlns:p14="http://schemas.microsoft.com/office/powerpoint/2010/main" val="1693232302"/>
       </p:ext>
     </p:extLst>
   </p:cSld>
@@ -718,7 +720,7 @@
           <a:p>
             <a:fld id="{8829343C-F7D9-4397-99EF-3FCA01B9EDB7}" type="slidenum">
               <a:rPr lang="en-US" smtClean="0"/>
-              <a:t>16</a:t>
+              <a:t>17</a:t>
             </a:fld>
             <a:endParaRPr lang="en-US"/>
           </a:p>
@@ -727,7 +729,7 @@
     </p:spTree>
     <p:extLst>
       <p:ext uri="{BB962C8B-B14F-4D97-AF65-F5344CB8AC3E}">
-        <p14:creationId xmlns:p14="http://schemas.microsoft.com/office/powerpoint/2010/main" val="4127378814"/>
+        <p14:creationId xmlns:p14="http://schemas.microsoft.com/office/powerpoint/2010/main" val="1836782914"/>
       </p:ext>
     </p:extLst>
   </p:cSld>
@@ -803,6 +805,90 @@
             <a:fld id="{8829343C-F7D9-4397-99EF-3FCA01B9EDB7}" type="slidenum">
               <a:rPr lang="en-US" smtClean="0"/>
               <a:t>18</a:t>
+            </a:fld>
+            <a:endParaRPr lang="en-US"/>
+          </a:p>
+        </p:txBody>
+      </p:sp>
+    </p:spTree>
+    <p:extLst>
+      <p:ext uri="{BB962C8B-B14F-4D97-AF65-F5344CB8AC3E}">
+        <p14:creationId xmlns:p14="http://schemas.microsoft.com/office/powerpoint/2010/main" val="4127378814"/>
+      </p:ext>
+    </p:extLst>
+  </p:cSld>
+  <p:clrMapOvr>
+    <a:masterClrMapping/>
+  </p:clrMapOvr>
+</p:notes>
+</file>
+
+<file path=ppt/notesSlides/notesSlide5.xml><?xml version="1.0" encoding="utf-8"?>
+<p:notes xmlns:a="http://schemas.openxmlformats.org/drawingml/2006/main" xmlns:r="http://schemas.openxmlformats.org/officeDocument/2006/relationships" xmlns:p="http://schemas.openxmlformats.org/presentationml/2006/main">
+  <p:cSld>
+    <p:spTree>
+      <p:nvGrpSpPr>
+        <p:cNvPr id="1" name=""/>
+        <p:cNvGrpSpPr/>
+        <p:nvPr/>
+      </p:nvGrpSpPr>
+      <p:grpSpPr>
+        <a:xfrm>
+          <a:off x="0" y="0"/>
+          <a:ext cx="0" cy="0"/>
+          <a:chOff x="0" y="0"/>
+          <a:chExt cx="0" cy="0"/>
+        </a:xfrm>
+      </p:grpSpPr>
+      <p:sp>
+        <p:nvSpPr>
+          <p:cNvPr id="2" name="Slide Image Placeholder 1"/>
+          <p:cNvSpPr>
+            <a:spLocks noGrp="1" noRot="1" noChangeAspect="1"/>
+          </p:cNvSpPr>
+          <p:nvPr>
+            <p:ph type="sldImg"/>
+          </p:nvPr>
+        </p:nvSpPr>
+        <p:spPr/>
+      </p:sp>
+      <p:sp>
+        <p:nvSpPr>
+          <p:cNvPr id="3" name="Notes Placeholder 2"/>
+          <p:cNvSpPr>
+            <a:spLocks noGrp="1"/>
+          </p:cNvSpPr>
+          <p:nvPr>
+            <p:ph type="body" idx="1"/>
+          </p:nvPr>
+        </p:nvSpPr>
+        <p:spPr/>
+        <p:txBody>
+          <a:bodyPr/>
+          <a:lstStyle/>
+          <a:p>
+            <a:endParaRPr lang="en-US" dirty="0"/>
+          </a:p>
+        </p:txBody>
+      </p:sp>
+      <p:sp>
+        <p:nvSpPr>
+          <p:cNvPr id="4" name="Slide Number Placeholder 3"/>
+          <p:cNvSpPr>
+            <a:spLocks noGrp="1"/>
+          </p:cNvSpPr>
+          <p:nvPr>
+            <p:ph type="sldNum" sz="quarter" idx="10"/>
+          </p:nvPr>
+        </p:nvSpPr>
+        <p:spPr/>
+        <p:txBody>
+          <a:bodyPr/>
+          <a:lstStyle/>
+          <a:p>
+            <a:fld id="{8829343C-F7D9-4397-99EF-3FCA01B9EDB7}" type="slidenum">
+              <a:rPr lang="en-US" smtClean="0"/>
+              <a:t>20</a:t>
             </a:fld>
             <a:endParaRPr lang="en-US"/>
           </a:p>
@@ -6919,8 +7005,8 @@
         </p:nvSpPr>
         <p:spPr>
           <a:xfrm>
-            <a:off x="557530" y="1160463"/>
-            <a:ext cx="10515600" cy="1746250"/>
+            <a:off x="557530" y="1160462"/>
+            <a:ext cx="10515600" cy="2781617"/>
           </a:xfrm>
         </p:spPr>
         <p:txBody>
@@ -6935,7 +7021,7 @@
             </a:pPr>
             <a:r>
               <a:rPr lang="en-US" dirty="0"/>
-              <a:t>Fully implemented</a:t>
+              <a:t>Updated:</a:t>
             </a:r>
           </a:p>
           <a:p>
@@ -6944,12 +7030,8 @@
               <a:buChar char="-"/>
             </a:pPr>
             <a:r>
-              <a:rPr lang="en-US" dirty="0" err="1"/>
-              <a:t>SupervisorHome</a:t>
-            </a:r>
-            <a:r>
-              <a:rPr lang="en-US" dirty="0"/>
-              <a:t> is presents managed Employees’ pending Goals</a:t>
+              <a:rPr lang="en-US" dirty="0"/>
+              <a:t>Removal of inefficient database queries</a:t>
             </a:r>
           </a:p>
           <a:p>
@@ -6959,7 +7041,7 @@
             </a:pPr>
             <a:r>
               <a:rPr lang="en-US" dirty="0"/>
-              <a:t>Approve/Deny correctly updates Goal “Active” and “Status” attributes</a:t>
+              <a:t>Removal of “magic number” validation failure</a:t>
             </a:r>
           </a:p>
           <a:p>
@@ -6969,15 +7051,17 @@
             </a:pPr>
             <a:r>
               <a:rPr lang="en-US" dirty="0"/>
-              <a:t>Uses </a:t>
-            </a:r>
-            <a:r>
-              <a:rPr lang="en-US" dirty="0" err="1"/>
-              <a:t>ActionMethod</a:t>
-            </a:r>
-            <a:r>
-              <a:rPr lang="en-US" dirty="0"/>
-              <a:t> w/o rendered View</a:t>
+              <a:t>Error &amp; exception handling</a:t>
+            </a:r>
+          </a:p>
+          <a:p>
+            <a:pPr marL="800100" lvl="1" indent="-342900">
+              <a:buFontTx/>
+              <a:buChar char="-"/>
+            </a:pPr>
+            <a:r>
+              <a:rPr lang="en-US" dirty="0"/>
+              <a:t>GET query hardening</a:t>
             </a:r>
           </a:p>
         </p:txBody>
@@ -7164,16 +7248,12 @@
           </a:lstStyle>
           <a:p>
             <a:r>
+              <a:rPr lang="en-US" dirty="0"/>
+              <a:t>Modified </a:t>
+            </a:r>
+            <a:r>
               <a:rPr lang="en-US" dirty="0" err="1"/>
-              <a:t>ApproveGoal</a:t>
-            </a:r>
-            <a:r>
-              <a:rPr lang="en-US" dirty="0"/>
-              <a:t> &amp; </a:t>
-            </a:r>
-            <a:r>
-              <a:rPr lang="en-US" dirty="0" err="1"/>
-              <a:t>DenyGoal</a:t>
+              <a:t>CreateEmployee</a:t>
             </a:r>
             <a:endParaRPr lang="en-US" dirty="0"/>
           </a:p>
@@ -7182,7 +7262,7 @@
     </p:spTree>
     <p:extLst>
       <p:ext uri="{BB962C8B-B14F-4D97-AF65-F5344CB8AC3E}">
-        <p14:creationId xmlns:p14="http://schemas.microsoft.com/office/powerpoint/2010/main" val="2080902266"/>
+        <p14:creationId xmlns:p14="http://schemas.microsoft.com/office/powerpoint/2010/main" val="2288731273"/>
       </p:ext>
     </p:extLst>
   </p:cSld>
@@ -7221,8 +7301,8 @@
         </p:nvSpPr>
         <p:spPr>
           <a:xfrm>
-            <a:off x="557530" y="1160463"/>
-            <a:ext cx="10515600" cy="1746250"/>
+            <a:off x="557530" y="1160462"/>
+            <a:ext cx="10515600" cy="2507297"/>
           </a:xfrm>
         </p:spPr>
         <p:txBody>
@@ -7236,12 +7316,8 @@
               <a:buChar char="-"/>
             </a:pPr>
             <a:r>
-              <a:rPr lang="en-US" dirty="0" err="1"/>
-              <a:t>AdminHome</a:t>
-            </a:r>
-            <a:r>
-              <a:rPr lang="en-US" dirty="0"/>
-              <a:t>:</a:t>
+              <a:rPr lang="en-US" dirty="0"/>
+              <a:t>Fully implemented</a:t>
             </a:r>
           </a:p>
           <a:p>
@@ -7250,8 +7326,12 @@
               <a:buChar char="-"/>
             </a:pPr>
             <a:r>
-              <a:rPr lang="en-US" dirty="0"/>
-              <a:t>Correctly pull lists of Employees vs Administrators</a:t>
+              <a:rPr lang="en-US" dirty="0" err="1"/>
+              <a:t>SupervisorHome</a:t>
+            </a:r>
+            <a:r>
+              <a:rPr lang="en-US" dirty="0"/>
+              <a:t> is presents managed Employees’ pending Goals</a:t>
             </a:r>
           </a:p>
           <a:p>
@@ -7259,7 +7339,38 @@
               <a:buFontTx/>
               <a:buChar char="-"/>
             </a:pPr>
-            <a:endParaRPr lang="en-US" dirty="0"/>
+            <a:r>
+              <a:rPr lang="en-US" dirty="0"/>
+              <a:t>Approve/Deny correctly updates Goal “Active” and “Status” attributes</a:t>
+            </a:r>
+          </a:p>
+          <a:p>
+            <a:pPr marL="800100" lvl="1" indent="-342900">
+              <a:buFontTx/>
+              <a:buChar char="-"/>
+            </a:pPr>
+            <a:r>
+              <a:rPr lang="en-US" dirty="0"/>
+              <a:t>Uses </a:t>
+            </a:r>
+            <a:r>
+              <a:rPr lang="en-US" dirty="0" err="1"/>
+              <a:t>ActionMethod</a:t>
+            </a:r>
+            <a:r>
+              <a:rPr lang="en-US" dirty="0"/>
+              <a:t> w/o rendered View</a:t>
+            </a:r>
+          </a:p>
+          <a:p>
+            <a:pPr marL="800100" lvl="1" indent="-342900">
+              <a:buFontTx/>
+              <a:buChar char="-"/>
+            </a:pPr>
+            <a:r>
+              <a:rPr lang="en-US" dirty="0"/>
+              <a:t>GET query hardening</a:t>
+            </a:r>
           </a:p>
         </p:txBody>
       </p:sp>
@@ -7445,231 +7556,17 @@
           </a:lstStyle>
           <a:p>
             <a:r>
-              <a:rPr lang="en-US" dirty="0"/>
-              <a:t>Updating Home Views</a:t>
-            </a:r>
-          </a:p>
-        </p:txBody>
-      </p:sp>
-      <p:sp>
-        <p:nvSpPr>
-          <p:cNvPr id="4" name="Text Placeholder 2"/>
-          <p:cNvSpPr txBox="1">
-            <a:spLocks/>
-          </p:cNvSpPr>
-          <p:nvPr/>
-        </p:nvSpPr>
-        <p:spPr>
-          <a:xfrm>
-            <a:off x="557530" y="2440623"/>
-            <a:ext cx="10515600" cy="1746250"/>
-          </a:xfrm>
-          <a:prstGeom prst="rect">
-            <a:avLst/>
-          </a:prstGeom>
-        </p:spPr>
-        <p:txBody>
-          <a:bodyPr vert="horz" lIns="91440" tIns="45720" rIns="91440" bIns="45720" rtlCol="0">
-            <a:normAutofit/>
-          </a:bodyPr>
-          <a:lstStyle>
-            <a:lvl1pPr marL="0" indent="0" algn="l" defTabSz="228508" rtl="0" eaLnBrk="1" latinLnBrk="0" hangingPunct="1">
-              <a:spcBef>
-                <a:spcPct val="20000"/>
-              </a:spcBef>
-              <a:buFont typeface="Arial"/>
-              <a:buNone/>
-              <a:defRPr sz="2400" kern="1200">
-                <a:solidFill>
-                  <a:schemeClr val="tx1">
-                    <a:tint val="75000"/>
-                  </a:schemeClr>
-                </a:solidFill>
-                <a:latin typeface="Roboto Medium"/>
-                <a:ea typeface="+mn-ea"/>
-                <a:cs typeface="+mn-cs"/>
-              </a:defRPr>
-            </a:lvl1pPr>
-            <a:lvl2pPr marL="457200" indent="0" algn="l" defTabSz="228508" rtl="0" eaLnBrk="1" latinLnBrk="0" hangingPunct="1">
-              <a:spcBef>
-                <a:spcPct val="20000"/>
-              </a:spcBef>
-              <a:buSzPct val="60000"/>
-              <a:buFont typeface="Lucida Grande"/>
-              <a:buNone/>
-              <a:defRPr sz="2000" kern="1200">
-                <a:solidFill>
-                  <a:schemeClr val="tx1">
-                    <a:tint val="75000"/>
-                  </a:schemeClr>
-                </a:solidFill>
-                <a:latin typeface="Roboto Medium"/>
-                <a:ea typeface="+mn-ea"/>
-                <a:cs typeface="+mn-cs"/>
-              </a:defRPr>
-            </a:lvl2pPr>
-            <a:lvl3pPr marL="914400" indent="0" algn="l" defTabSz="228508" rtl="0" eaLnBrk="1" latinLnBrk="0" hangingPunct="1">
-              <a:spcBef>
-                <a:spcPct val="20000"/>
-              </a:spcBef>
-              <a:buSzPct val="60000"/>
-              <a:buFont typeface="Lucida Grande"/>
-              <a:buNone/>
-              <a:defRPr sz="1800" kern="1200">
-                <a:solidFill>
-                  <a:schemeClr val="tx1">
-                    <a:tint val="75000"/>
-                  </a:schemeClr>
-                </a:solidFill>
-                <a:latin typeface="Roboto Medium"/>
-                <a:ea typeface="+mn-ea"/>
-                <a:cs typeface="+mn-cs"/>
-              </a:defRPr>
-            </a:lvl3pPr>
-            <a:lvl4pPr marL="1371600" indent="0" algn="l" defTabSz="228508" rtl="0" eaLnBrk="1" latinLnBrk="0" hangingPunct="1">
-              <a:spcBef>
-                <a:spcPct val="20000"/>
-              </a:spcBef>
-              <a:buSzPct val="60000"/>
-              <a:buFont typeface="Lucida Grande"/>
-              <a:buNone/>
-              <a:defRPr sz="1600" kern="1200">
-                <a:solidFill>
-                  <a:schemeClr val="tx1">
-                    <a:tint val="75000"/>
-                  </a:schemeClr>
-                </a:solidFill>
-                <a:latin typeface="Roboto Medium"/>
-                <a:ea typeface="+mn-ea"/>
-                <a:cs typeface="+mn-cs"/>
-              </a:defRPr>
-            </a:lvl4pPr>
-            <a:lvl5pPr marL="1828800" indent="0" algn="l" defTabSz="228508" rtl="0" eaLnBrk="1" latinLnBrk="0" hangingPunct="1">
-              <a:spcBef>
-                <a:spcPct val="20000"/>
-              </a:spcBef>
-              <a:buSzPct val="60000"/>
-              <a:buFont typeface="Lucida Grande"/>
-              <a:buNone/>
-              <a:defRPr sz="1600" kern="1200">
-                <a:solidFill>
-                  <a:schemeClr val="tx1">
-                    <a:tint val="75000"/>
-                  </a:schemeClr>
-                </a:solidFill>
-                <a:latin typeface="Roboto Medium"/>
-                <a:ea typeface="+mn-ea"/>
-                <a:cs typeface="+mn-cs"/>
-              </a:defRPr>
-            </a:lvl5pPr>
-            <a:lvl6pPr marL="2286000" indent="0" algn="l" defTabSz="228508" rtl="0" eaLnBrk="1" latinLnBrk="0" hangingPunct="1">
-              <a:spcBef>
-                <a:spcPct val="20000"/>
-              </a:spcBef>
-              <a:buFont typeface="Arial"/>
-              <a:buNone/>
-              <a:defRPr sz="1600" kern="1200">
-                <a:solidFill>
-                  <a:schemeClr val="tx1">
-                    <a:tint val="75000"/>
-                  </a:schemeClr>
-                </a:solidFill>
-                <a:latin typeface="+mn-lt"/>
-                <a:ea typeface="+mn-ea"/>
-                <a:cs typeface="+mn-cs"/>
-              </a:defRPr>
-            </a:lvl6pPr>
-            <a:lvl7pPr marL="2743200" indent="0" algn="l" defTabSz="228508" rtl="0" eaLnBrk="1" latinLnBrk="0" hangingPunct="1">
-              <a:spcBef>
-                <a:spcPct val="20000"/>
-              </a:spcBef>
-              <a:buFont typeface="Arial"/>
-              <a:buNone/>
-              <a:defRPr sz="1600" kern="1200">
-                <a:solidFill>
-                  <a:schemeClr val="tx1">
-                    <a:tint val="75000"/>
-                  </a:schemeClr>
-                </a:solidFill>
-                <a:latin typeface="+mn-lt"/>
-                <a:ea typeface="+mn-ea"/>
-                <a:cs typeface="+mn-cs"/>
-              </a:defRPr>
-            </a:lvl7pPr>
-            <a:lvl8pPr marL="3200400" indent="0" algn="l" defTabSz="228508" rtl="0" eaLnBrk="1" latinLnBrk="0" hangingPunct="1">
-              <a:spcBef>
-                <a:spcPct val="20000"/>
-              </a:spcBef>
-              <a:buFont typeface="Arial"/>
-              <a:buNone/>
-              <a:defRPr sz="1600" kern="1200">
-                <a:solidFill>
-                  <a:schemeClr val="tx1">
-                    <a:tint val="75000"/>
-                  </a:schemeClr>
-                </a:solidFill>
-                <a:latin typeface="+mn-lt"/>
-                <a:ea typeface="+mn-ea"/>
-                <a:cs typeface="+mn-cs"/>
-              </a:defRPr>
-            </a:lvl8pPr>
-            <a:lvl9pPr marL="3657600" indent="0" algn="l" defTabSz="228508" rtl="0" eaLnBrk="1" latinLnBrk="0" hangingPunct="1">
-              <a:spcBef>
-                <a:spcPct val="20000"/>
-              </a:spcBef>
-              <a:buFont typeface="Arial"/>
-              <a:buNone/>
-              <a:defRPr sz="1600" kern="1200">
-                <a:solidFill>
-                  <a:schemeClr val="tx1">
-                    <a:tint val="75000"/>
-                  </a:schemeClr>
-                </a:solidFill>
-                <a:latin typeface="+mn-lt"/>
-                <a:ea typeface="+mn-ea"/>
-                <a:cs typeface="+mn-cs"/>
-              </a:defRPr>
-            </a:lvl9pPr>
-          </a:lstStyle>
-          <a:p>
-            <a:pPr marL="342900" indent="-342900">
-              <a:buFontTx/>
-              <a:buChar char="-"/>
-            </a:pPr>
-            <a:r>
               <a:rPr lang="en-US" dirty="0" err="1"/>
-              <a:t>SupervisorHome</a:t>
-            </a:r>
-            <a:r>
-              <a:rPr lang="en-US" dirty="0"/>
-              <a:t>:</a:t>
-            </a:r>
-          </a:p>
-          <a:p>
-            <a:pPr marL="800100" lvl="1" indent="-342900">
-              <a:buFontTx/>
-              <a:buChar char="-"/>
-            </a:pPr>
-            <a:r>
-              <a:rPr lang="en-US" dirty="0"/>
-              <a:t>Clearer data presentation</a:t>
-            </a:r>
-          </a:p>
-          <a:p>
-            <a:pPr marL="800100" lvl="1" indent="-342900">
-              <a:buFontTx/>
-              <a:buChar char="-"/>
-            </a:pPr>
-            <a:r>
-              <a:rPr lang="en-US" dirty="0"/>
-              <a:t>Current implementation removed empty list checks (temporary)</a:t>
-            </a:r>
-          </a:p>
-          <a:p>
-            <a:pPr marL="800100" lvl="1" indent="-342900">
-              <a:buFontTx/>
-              <a:buChar char="-"/>
-            </a:pPr>
+              <a:t>ApproveGoal</a:t>
+            </a:r>
+            <a:r>
+              <a:rPr lang="en-US" dirty="0"/>
+              <a:t> &amp; </a:t>
+            </a:r>
+            <a:r>
+              <a:rPr lang="en-US" dirty="0" err="1"/>
+              <a:t>DenyGoal</a:t>
+            </a:r>
             <a:endParaRPr lang="en-US" dirty="0"/>
           </a:p>
         </p:txBody>
@@ -7677,7 +7574,7 @@
     </p:spTree>
     <p:extLst>
       <p:ext uri="{BB962C8B-B14F-4D97-AF65-F5344CB8AC3E}">
-        <p14:creationId xmlns:p14="http://schemas.microsoft.com/office/powerpoint/2010/main" val="3707923136"/>
+        <p14:creationId xmlns:p14="http://schemas.microsoft.com/office/powerpoint/2010/main" val="2080902266"/>
       </p:ext>
     </p:extLst>
   </p:cSld>
@@ -7716,8 +7613,8 @@
         </p:nvSpPr>
         <p:spPr>
           <a:xfrm>
-            <a:off x="557530" y="1160462"/>
-            <a:ext cx="10515600" cy="2588577"/>
+            <a:off x="557530" y="1160463"/>
+            <a:ext cx="10515600" cy="1746250"/>
           </a:xfrm>
         </p:spPr>
         <p:txBody>
@@ -7731,8 +7628,12 @@
               <a:buChar char="-"/>
             </a:pPr>
             <a:r>
-              <a:rPr lang="en-US" dirty="0"/>
-              <a:t>A successful Goal Update now:</a:t>
+              <a:rPr lang="en-US" dirty="0" err="1"/>
+              <a:t>AdminHome</a:t>
+            </a:r>
+            <a:r>
+              <a:rPr lang="en-US" dirty="0"/>
+              <a:t>:</a:t>
             </a:r>
           </a:p>
           <a:p>
@@ -7742,7 +7643,7 @@
             </a:pPr>
             <a:r>
               <a:rPr lang="en-US" dirty="0"/>
-              <a:t>Checks if Update progress is &gt;= Goal’s prior Progress</a:t>
+              <a:t>Correctly pull lists of Employees vs Administrators</a:t>
             </a:r>
           </a:p>
           <a:p>
@@ -7750,20 +7651,7 @@
               <a:buFontTx/>
               <a:buChar char="-"/>
             </a:pPr>
-            <a:r>
-              <a:rPr lang="en-US" dirty="0"/>
-              <a:t>Provided Progress passes validation, Goal’s Progress attribute is updated &amp; presented</a:t>
-            </a:r>
-          </a:p>
-          <a:p>
-            <a:pPr marL="342900" indent="-342900">
-              <a:buFontTx/>
-              <a:buChar char="-"/>
-            </a:pPr>
-            <a:r>
-              <a:rPr lang="en-US" dirty="0"/>
-              <a:t>Progress bounded [0,100]</a:t>
-            </a:r>
+            <a:endParaRPr lang="en-US" dirty="0"/>
           </a:p>
         </p:txBody>
       </p:sp>
@@ -7950,15 +7838,238 @@
           <a:p>
             <a:r>
               <a:rPr lang="en-US" dirty="0"/>
-              <a:t>Goal Progress Logic</a:t>
-            </a:r>
+              <a:t>Updating Home Views</a:t>
+            </a:r>
+          </a:p>
+        </p:txBody>
+      </p:sp>
+      <p:sp>
+        <p:nvSpPr>
+          <p:cNvPr id="4" name="Text Placeholder 2"/>
+          <p:cNvSpPr txBox="1">
+            <a:spLocks/>
+          </p:cNvSpPr>
+          <p:nvPr/>
+        </p:nvSpPr>
+        <p:spPr>
+          <a:xfrm>
+            <a:off x="557530" y="2440623"/>
+            <a:ext cx="10515600" cy="1746250"/>
+          </a:xfrm>
+          <a:prstGeom prst="rect">
+            <a:avLst/>
+          </a:prstGeom>
+        </p:spPr>
+        <p:txBody>
+          <a:bodyPr vert="horz" lIns="91440" tIns="45720" rIns="91440" bIns="45720" rtlCol="0">
+            <a:normAutofit/>
+          </a:bodyPr>
+          <a:lstStyle>
+            <a:lvl1pPr marL="0" indent="0" algn="l" defTabSz="228508" rtl="0" eaLnBrk="1" latinLnBrk="0" hangingPunct="1">
+              <a:spcBef>
+                <a:spcPct val="20000"/>
+              </a:spcBef>
+              <a:buFont typeface="Arial"/>
+              <a:buNone/>
+              <a:defRPr sz="2400" kern="1200">
+                <a:solidFill>
+                  <a:schemeClr val="tx1">
+                    <a:tint val="75000"/>
+                  </a:schemeClr>
+                </a:solidFill>
+                <a:latin typeface="Roboto Medium"/>
+                <a:ea typeface="+mn-ea"/>
+                <a:cs typeface="+mn-cs"/>
+              </a:defRPr>
+            </a:lvl1pPr>
+            <a:lvl2pPr marL="457200" indent="0" algn="l" defTabSz="228508" rtl="0" eaLnBrk="1" latinLnBrk="0" hangingPunct="1">
+              <a:spcBef>
+                <a:spcPct val="20000"/>
+              </a:spcBef>
+              <a:buSzPct val="60000"/>
+              <a:buFont typeface="Lucida Grande"/>
+              <a:buNone/>
+              <a:defRPr sz="2000" kern="1200">
+                <a:solidFill>
+                  <a:schemeClr val="tx1">
+                    <a:tint val="75000"/>
+                  </a:schemeClr>
+                </a:solidFill>
+                <a:latin typeface="Roboto Medium"/>
+                <a:ea typeface="+mn-ea"/>
+                <a:cs typeface="+mn-cs"/>
+              </a:defRPr>
+            </a:lvl2pPr>
+            <a:lvl3pPr marL="914400" indent="0" algn="l" defTabSz="228508" rtl="0" eaLnBrk="1" latinLnBrk="0" hangingPunct="1">
+              <a:spcBef>
+                <a:spcPct val="20000"/>
+              </a:spcBef>
+              <a:buSzPct val="60000"/>
+              <a:buFont typeface="Lucida Grande"/>
+              <a:buNone/>
+              <a:defRPr sz="1800" kern="1200">
+                <a:solidFill>
+                  <a:schemeClr val="tx1">
+                    <a:tint val="75000"/>
+                  </a:schemeClr>
+                </a:solidFill>
+                <a:latin typeface="Roboto Medium"/>
+                <a:ea typeface="+mn-ea"/>
+                <a:cs typeface="+mn-cs"/>
+              </a:defRPr>
+            </a:lvl3pPr>
+            <a:lvl4pPr marL="1371600" indent="0" algn="l" defTabSz="228508" rtl="0" eaLnBrk="1" latinLnBrk="0" hangingPunct="1">
+              <a:spcBef>
+                <a:spcPct val="20000"/>
+              </a:spcBef>
+              <a:buSzPct val="60000"/>
+              <a:buFont typeface="Lucida Grande"/>
+              <a:buNone/>
+              <a:defRPr sz="1600" kern="1200">
+                <a:solidFill>
+                  <a:schemeClr val="tx1">
+                    <a:tint val="75000"/>
+                  </a:schemeClr>
+                </a:solidFill>
+                <a:latin typeface="Roboto Medium"/>
+                <a:ea typeface="+mn-ea"/>
+                <a:cs typeface="+mn-cs"/>
+              </a:defRPr>
+            </a:lvl4pPr>
+            <a:lvl5pPr marL="1828800" indent="0" algn="l" defTabSz="228508" rtl="0" eaLnBrk="1" latinLnBrk="0" hangingPunct="1">
+              <a:spcBef>
+                <a:spcPct val="20000"/>
+              </a:spcBef>
+              <a:buSzPct val="60000"/>
+              <a:buFont typeface="Lucida Grande"/>
+              <a:buNone/>
+              <a:defRPr sz="1600" kern="1200">
+                <a:solidFill>
+                  <a:schemeClr val="tx1">
+                    <a:tint val="75000"/>
+                  </a:schemeClr>
+                </a:solidFill>
+                <a:latin typeface="Roboto Medium"/>
+                <a:ea typeface="+mn-ea"/>
+                <a:cs typeface="+mn-cs"/>
+              </a:defRPr>
+            </a:lvl5pPr>
+            <a:lvl6pPr marL="2286000" indent="0" algn="l" defTabSz="228508" rtl="0" eaLnBrk="1" latinLnBrk="0" hangingPunct="1">
+              <a:spcBef>
+                <a:spcPct val="20000"/>
+              </a:spcBef>
+              <a:buFont typeface="Arial"/>
+              <a:buNone/>
+              <a:defRPr sz="1600" kern="1200">
+                <a:solidFill>
+                  <a:schemeClr val="tx1">
+                    <a:tint val="75000"/>
+                  </a:schemeClr>
+                </a:solidFill>
+                <a:latin typeface="+mn-lt"/>
+                <a:ea typeface="+mn-ea"/>
+                <a:cs typeface="+mn-cs"/>
+              </a:defRPr>
+            </a:lvl6pPr>
+            <a:lvl7pPr marL="2743200" indent="0" algn="l" defTabSz="228508" rtl="0" eaLnBrk="1" latinLnBrk="0" hangingPunct="1">
+              <a:spcBef>
+                <a:spcPct val="20000"/>
+              </a:spcBef>
+              <a:buFont typeface="Arial"/>
+              <a:buNone/>
+              <a:defRPr sz="1600" kern="1200">
+                <a:solidFill>
+                  <a:schemeClr val="tx1">
+                    <a:tint val="75000"/>
+                  </a:schemeClr>
+                </a:solidFill>
+                <a:latin typeface="+mn-lt"/>
+                <a:ea typeface="+mn-ea"/>
+                <a:cs typeface="+mn-cs"/>
+              </a:defRPr>
+            </a:lvl7pPr>
+            <a:lvl8pPr marL="3200400" indent="0" algn="l" defTabSz="228508" rtl="0" eaLnBrk="1" latinLnBrk="0" hangingPunct="1">
+              <a:spcBef>
+                <a:spcPct val="20000"/>
+              </a:spcBef>
+              <a:buFont typeface="Arial"/>
+              <a:buNone/>
+              <a:defRPr sz="1600" kern="1200">
+                <a:solidFill>
+                  <a:schemeClr val="tx1">
+                    <a:tint val="75000"/>
+                  </a:schemeClr>
+                </a:solidFill>
+                <a:latin typeface="+mn-lt"/>
+                <a:ea typeface="+mn-ea"/>
+                <a:cs typeface="+mn-cs"/>
+              </a:defRPr>
+            </a:lvl8pPr>
+            <a:lvl9pPr marL="3657600" indent="0" algn="l" defTabSz="228508" rtl="0" eaLnBrk="1" latinLnBrk="0" hangingPunct="1">
+              <a:spcBef>
+                <a:spcPct val="20000"/>
+              </a:spcBef>
+              <a:buFont typeface="Arial"/>
+              <a:buNone/>
+              <a:defRPr sz="1600" kern="1200">
+                <a:solidFill>
+                  <a:schemeClr val="tx1">
+                    <a:tint val="75000"/>
+                  </a:schemeClr>
+                </a:solidFill>
+                <a:latin typeface="+mn-lt"/>
+                <a:ea typeface="+mn-ea"/>
+                <a:cs typeface="+mn-cs"/>
+              </a:defRPr>
+            </a:lvl9pPr>
+          </a:lstStyle>
+          <a:p>
+            <a:pPr marL="342900" indent="-342900">
+              <a:buFontTx/>
+              <a:buChar char="-"/>
+            </a:pPr>
+            <a:r>
+              <a:rPr lang="en-US" dirty="0" err="1"/>
+              <a:t>SupervisorHome</a:t>
+            </a:r>
+            <a:r>
+              <a:rPr lang="en-US" dirty="0"/>
+              <a:t>:</a:t>
+            </a:r>
+          </a:p>
+          <a:p>
+            <a:pPr marL="800100" lvl="1" indent="-342900">
+              <a:buFontTx/>
+              <a:buChar char="-"/>
+            </a:pPr>
+            <a:r>
+              <a:rPr lang="en-US" dirty="0"/>
+              <a:t>Clearer data presentation</a:t>
+            </a:r>
+          </a:p>
+          <a:p>
+            <a:pPr marL="800100" lvl="1" indent="-342900">
+              <a:buFontTx/>
+              <a:buChar char="-"/>
+            </a:pPr>
+            <a:r>
+              <a:rPr lang="en-US" dirty="0"/>
+              <a:t>Current implementation removed empty list checks (temporary)</a:t>
+            </a:r>
+          </a:p>
+          <a:p>
+            <a:pPr marL="800100" lvl="1" indent="-342900">
+              <a:buFontTx/>
+              <a:buChar char="-"/>
+            </a:pPr>
+            <a:endParaRPr lang="en-US" dirty="0"/>
           </a:p>
         </p:txBody>
       </p:sp>
     </p:spTree>
     <p:extLst>
       <p:ext uri="{BB962C8B-B14F-4D97-AF65-F5344CB8AC3E}">
-        <p14:creationId xmlns:p14="http://schemas.microsoft.com/office/powerpoint/2010/main" val="276996288"/>
+        <p14:creationId xmlns:p14="http://schemas.microsoft.com/office/powerpoint/2010/main" val="3707923136"/>
       </p:ext>
     </p:extLst>
   </p:cSld>
@@ -7987,28 +8098,6 @@
       </p:grpSpPr>
       <p:sp>
         <p:nvSpPr>
-          <p:cNvPr id="2" name="Title 1"/>
-          <p:cNvSpPr>
-            <a:spLocks noGrp="1"/>
-          </p:cNvSpPr>
-          <p:nvPr>
-            <p:ph type="title"/>
-          </p:nvPr>
-        </p:nvSpPr>
-        <p:spPr/>
-        <p:txBody>
-          <a:bodyPr/>
-          <a:lstStyle/>
-          <a:p>
-            <a:r>
-              <a:rPr lang="en-US" cap="none" dirty="0"/>
-              <a:t>Nonfunctional Requirements</a:t>
-            </a:r>
-          </a:p>
-        </p:txBody>
-      </p:sp>
-      <p:sp>
-        <p:nvSpPr>
           <p:cNvPr id="3" name="Text Placeholder 2"/>
           <p:cNvSpPr>
             <a:spLocks noGrp="1"/>
@@ -8017,19 +8106,251 @@
             <p:ph type="body" idx="1"/>
           </p:nvPr>
         </p:nvSpPr>
-        <p:spPr/>
-        <p:txBody>
-          <a:bodyPr/>
+        <p:spPr>
+          <a:xfrm>
+            <a:off x="557530" y="1160462"/>
+            <a:ext cx="10515600" cy="2588577"/>
+          </a:xfrm>
+        </p:spPr>
+        <p:txBody>
+          <a:bodyPr>
+            <a:normAutofit/>
+          </a:bodyPr>
           <a:lstStyle/>
           <a:p>
-            <a:endParaRPr lang="en-US" dirty="0"/>
+            <a:pPr marL="342900" indent="-342900">
+              <a:buFontTx/>
+              <a:buChar char="-"/>
+            </a:pPr>
+            <a:r>
+              <a:rPr lang="en-US" dirty="0"/>
+              <a:t>A successful Goal Update now:</a:t>
+            </a:r>
+          </a:p>
+          <a:p>
+            <a:pPr marL="800100" lvl="1" indent="-342900">
+              <a:buFontTx/>
+              <a:buChar char="-"/>
+            </a:pPr>
+            <a:r>
+              <a:rPr lang="en-US" dirty="0"/>
+              <a:t>Checks if Update progress is &gt;= Goal’s prior Progress</a:t>
+            </a:r>
+          </a:p>
+          <a:p>
+            <a:pPr marL="800100" lvl="1" indent="-342900">
+              <a:buFontTx/>
+              <a:buChar char="-"/>
+            </a:pPr>
+            <a:r>
+              <a:rPr lang="en-US" dirty="0"/>
+              <a:t>Provided Progress passes validation, Goal’s Progress attribute is updated &amp; presented</a:t>
+            </a:r>
+          </a:p>
+          <a:p>
+            <a:pPr marL="342900" indent="-342900">
+              <a:buFontTx/>
+              <a:buChar char="-"/>
+            </a:pPr>
+            <a:r>
+              <a:rPr lang="en-US" dirty="0"/>
+              <a:t>Progress bounded [0,100]</a:t>
+            </a:r>
+          </a:p>
+        </p:txBody>
+      </p:sp>
+      <p:sp>
+        <p:nvSpPr>
+          <p:cNvPr id="5" name="Text Placeholder 2"/>
+          <p:cNvSpPr txBox="1">
+            <a:spLocks/>
+          </p:cNvSpPr>
+          <p:nvPr/>
+        </p:nvSpPr>
+        <p:spPr>
+          <a:xfrm>
+            <a:off x="557530" y="456089"/>
+            <a:ext cx="10515600" cy="458311"/>
+          </a:xfrm>
+          <a:prstGeom prst="rect">
+            <a:avLst/>
+          </a:prstGeom>
+        </p:spPr>
+        <p:txBody>
+          <a:bodyPr vert="horz" lIns="91440" tIns="45720" rIns="91440" bIns="45720" rtlCol="0">
+            <a:normAutofit/>
+          </a:bodyPr>
+          <a:lstStyle>
+            <a:lvl1pPr marL="0" indent="0" algn="l" defTabSz="228508" rtl="0" eaLnBrk="1" latinLnBrk="0" hangingPunct="1">
+              <a:spcBef>
+                <a:spcPct val="20000"/>
+              </a:spcBef>
+              <a:buFont typeface="Arial"/>
+              <a:buNone/>
+              <a:defRPr sz="2400" kern="1200">
+                <a:solidFill>
+                  <a:schemeClr val="tx1">
+                    <a:tint val="75000"/>
+                  </a:schemeClr>
+                </a:solidFill>
+                <a:latin typeface="Roboto Medium"/>
+                <a:ea typeface="+mn-ea"/>
+                <a:cs typeface="+mn-cs"/>
+              </a:defRPr>
+            </a:lvl1pPr>
+            <a:lvl2pPr marL="457200" indent="0" algn="l" defTabSz="228508" rtl="0" eaLnBrk="1" latinLnBrk="0" hangingPunct="1">
+              <a:spcBef>
+                <a:spcPct val="20000"/>
+              </a:spcBef>
+              <a:buSzPct val="60000"/>
+              <a:buFont typeface="Lucida Grande"/>
+              <a:buNone/>
+              <a:defRPr sz="2000" kern="1200">
+                <a:solidFill>
+                  <a:schemeClr val="tx1">
+                    <a:tint val="75000"/>
+                  </a:schemeClr>
+                </a:solidFill>
+                <a:latin typeface="Roboto Medium"/>
+                <a:ea typeface="+mn-ea"/>
+                <a:cs typeface="+mn-cs"/>
+              </a:defRPr>
+            </a:lvl2pPr>
+            <a:lvl3pPr marL="914400" indent="0" algn="l" defTabSz="228508" rtl="0" eaLnBrk="1" latinLnBrk="0" hangingPunct="1">
+              <a:spcBef>
+                <a:spcPct val="20000"/>
+              </a:spcBef>
+              <a:buSzPct val="60000"/>
+              <a:buFont typeface="Lucida Grande"/>
+              <a:buNone/>
+              <a:defRPr sz="1800" kern="1200">
+                <a:solidFill>
+                  <a:schemeClr val="tx1">
+                    <a:tint val="75000"/>
+                  </a:schemeClr>
+                </a:solidFill>
+                <a:latin typeface="Roboto Medium"/>
+                <a:ea typeface="+mn-ea"/>
+                <a:cs typeface="+mn-cs"/>
+              </a:defRPr>
+            </a:lvl3pPr>
+            <a:lvl4pPr marL="1371600" indent="0" algn="l" defTabSz="228508" rtl="0" eaLnBrk="1" latinLnBrk="0" hangingPunct="1">
+              <a:spcBef>
+                <a:spcPct val="20000"/>
+              </a:spcBef>
+              <a:buSzPct val="60000"/>
+              <a:buFont typeface="Lucida Grande"/>
+              <a:buNone/>
+              <a:defRPr sz="1600" kern="1200">
+                <a:solidFill>
+                  <a:schemeClr val="tx1">
+                    <a:tint val="75000"/>
+                  </a:schemeClr>
+                </a:solidFill>
+                <a:latin typeface="Roboto Medium"/>
+                <a:ea typeface="+mn-ea"/>
+                <a:cs typeface="+mn-cs"/>
+              </a:defRPr>
+            </a:lvl4pPr>
+            <a:lvl5pPr marL="1828800" indent="0" algn="l" defTabSz="228508" rtl="0" eaLnBrk="1" latinLnBrk="0" hangingPunct="1">
+              <a:spcBef>
+                <a:spcPct val="20000"/>
+              </a:spcBef>
+              <a:buSzPct val="60000"/>
+              <a:buFont typeface="Lucida Grande"/>
+              <a:buNone/>
+              <a:defRPr sz="1600" kern="1200">
+                <a:solidFill>
+                  <a:schemeClr val="tx1">
+                    <a:tint val="75000"/>
+                  </a:schemeClr>
+                </a:solidFill>
+                <a:latin typeface="Roboto Medium"/>
+                <a:ea typeface="+mn-ea"/>
+                <a:cs typeface="+mn-cs"/>
+              </a:defRPr>
+            </a:lvl5pPr>
+            <a:lvl6pPr marL="2286000" indent="0" algn="l" defTabSz="228508" rtl="0" eaLnBrk="1" latinLnBrk="0" hangingPunct="1">
+              <a:spcBef>
+                <a:spcPct val="20000"/>
+              </a:spcBef>
+              <a:buFont typeface="Arial"/>
+              <a:buNone/>
+              <a:defRPr sz="1600" kern="1200">
+                <a:solidFill>
+                  <a:schemeClr val="tx1">
+                    <a:tint val="75000"/>
+                  </a:schemeClr>
+                </a:solidFill>
+                <a:latin typeface="+mn-lt"/>
+                <a:ea typeface="+mn-ea"/>
+                <a:cs typeface="+mn-cs"/>
+              </a:defRPr>
+            </a:lvl6pPr>
+            <a:lvl7pPr marL="2743200" indent="0" algn="l" defTabSz="228508" rtl="0" eaLnBrk="1" latinLnBrk="0" hangingPunct="1">
+              <a:spcBef>
+                <a:spcPct val="20000"/>
+              </a:spcBef>
+              <a:buFont typeface="Arial"/>
+              <a:buNone/>
+              <a:defRPr sz="1600" kern="1200">
+                <a:solidFill>
+                  <a:schemeClr val="tx1">
+                    <a:tint val="75000"/>
+                  </a:schemeClr>
+                </a:solidFill>
+                <a:latin typeface="+mn-lt"/>
+                <a:ea typeface="+mn-ea"/>
+                <a:cs typeface="+mn-cs"/>
+              </a:defRPr>
+            </a:lvl7pPr>
+            <a:lvl8pPr marL="3200400" indent="0" algn="l" defTabSz="228508" rtl="0" eaLnBrk="1" latinLnBrk="0" hangingPunct="1">
+              <a:spcBef>
+                <a:spcPct val="20000"/>
+              </a:spcBef>
+              <a:buFont typeface="Arial"/>
+              <a:buNone/>
+              <a:defRPr sz="1600" kern="1200">
+                <a:solidFill>
+                  <a:schemeClr val="tx1">
+                    <a:tint val="75000"/>
+                  </a:schemeClr>
+                </a:solidFill>
+                <a:latin typeface="+mn-lt"/>
+                <a:ea typeface="+mn-ea"/>
+                <a:cs typeface="+mn-cs"/>
+              </a:defRPr>
+            </a:lvl8pPr>
+            <a:lvl9pPr marL="3657600" indent="0" algn="l" defTabSz="228508" rtl="0" eaLnBrk="1" latinLnBrk="0" hangingPunct="1">
+              <a:spcBef>
+                <a:spcPct val="20000"/>
+              </a:spcBef>
+              <a:buFont typeface="Arial"/>
+              <a:buNone/>
+              <a:defRPr sz="1600" kern="1200">
+                <a:solidFill>
+                  <a:schemeClr val="tx1">
+                    <a:tint val="75000"/>
+                  </a:schemeClr>
+                </a:solidFill>
+                <a:latin typeface="+mn-lt"/>
+                <a:ea typeface="+mn-ea"/>
+                <a:cs typeface="+mn-cs"/>
+              </a:defRPr>
+            </a:lvl9pPr>
+          </a:lstStyle>
+          <a:p>
+            <a:r>
+              <a:rPr lang="en-US" dirty="0"/>
+              <a:t>Goal Progress Logic</a:t>
+            </a:r>
           </a:p>
         </p:txBody>
       </p:sp>
     </p:spTree>
     <p:extLst>
       <p:ext uri="{BB962C8B-B14F-4D97-AF65-F5344CB8AC3E}">
-        <p14:creationId xmlns:p14="http://schemas.microsoft.com/office/powerpoint/2010/main" val="493993887"/>
+        <p14:creationId xmlns:p14="http://schemas.microsoft.com/office/powerpoint/2010/main" val="276996288"/>
       </p:ext>
     </p:extLst>
   </p:cSld>
@@ -8058,6 +8379,28 @@
       </p:grpSpPr>
       <p:sp>
         <p:nvSpPr>
+          <p:cNvPr id="2" name="Title 1"/>
+          <p:cNvSpPr>
+            <a:spLocks noGrp="1"/>
+          </p:cNvSpPr>
+          <p:nvPr>
+            <p:ph type="title"/>
+          </p:nvPr>
+        </p:nvSpPr>
+        <p:spPr/>
+        <p:txBody>
+          <a:bodyPr/>
+          <a:lstStyle/>
+          <a:p>
+            <a:r>
+              <a:rPr lang="en-US" cap="none" dirty="0"/>
+              <a:t>Nonfunctional Requirements</a:t>
+            </a:r>
+          </a:p>
+        </p:txBody>
+      </p:sp>
+      <p:sp>
+        <p:nvSpPr>
           <p:cNvPr id="3" name="Text Placeholder 2"/>
           <p:cNvSpPr>
             <a:spLocks noGrp="1"/>
@@ -8066,273 +8409,19 @@
             <p:ph type="body" idx="1"/>
           </p:nvPr>
         </p:nvSpPr>
-        <p:spPr>
-          <a:xfrm>
-            <a:off x="557530" y="1160463"/>
-            <a:ext cx="10515600" cy="5179377"/>
-          </a:xfrm>
-        </p:spPr>
-        <p:txBody>
-          <a:bodyPr>
-            <a:normAutofit/>
-          </a:bodyPr>
+        <p:spPr/>
+        <p:txBody>
+          <a:bodyPr/>
           <a:lstStyle/>
           <a:p>
-            <a:pPr marL="342900" indent="-342900">
-              <a:buFontTx/>
-              <a:buChar char="-"/>
-            </a:pPr>
-            <a:r>
-              <a:rPr lang="en-US" dirty="0"/>
-              <a:t>Failed form validation still returns to appropriate GET method</a:t>
-            </a:r>
-          </a:p>
-          <a:p>
-            <a:pPr marL="800100" lvl="1" indent="-342900">
-              <a:buFontTx/>
-              <a:buChar char="-"/>
-            </a:pPr>
-            <a:r>
-              <a:rPr lang="en-US" dirty="0"/>
-              <a:t>If GET </a:t>
-            </a:r>
-            <a:r>
-              <a:rPr lang="en-US" dirty="0" err="1"/>
-              <a:t>querystring</a:t>
-            </a:r>
-            <a:r>
-              <a:rPr lang="en-US" dirty="0"/>
-              <a:t> carries invalid reference IDs (for DB lookup), exception is handled and returned to GET</a:t>
-            </a:r>
-          </a:p>
-          <a:p>
-            <a:pPr marL="800100" lvl="1" indent="-342900">
-              <a:buFontTx/>
-              <a:buChar char="-"/>
-            </a:pPr>
-            <a:r>
-              <a:rPr lang="en-US" dirty="0"/>
-              <a:t>If POST form data carries invalid reference, exception is handled gracefully</a:t>
-            </a:r>
-          </a:p>
-          <a:p>
-            <a:pPr marL="342900" indent="-342900">
-              <a:buFontTx/>
-              <a:buChar char="-"/>
-            </a:pPr>
-            <a:r>
-              <a:rPr lang="en-US" dirty="0"/>
-              <a:t>Changed reference keys to string to prevent easily-manipulated exploitation</a:t>
-            </a:r>
-          </a:p>
-          <a:p>
-            <a:pPr marL="1257300" lvl="2" indent="-342900">
-              <a:buFontTx/>
-              <a:buChar char="-"/>
-            </a:pPr>
             <a:endParaRPr lang="en-US" dirty="0"/>
-          </a:p>
-          <a:p>
-            <a:pPr marL="1257300" lvl="2" indent="-342900">
-              <a:buFontTx/>
-              <a:buChar char="-"/>
-            </a:pPr>
-            <a:endParaRPr lang="en-US" dirty="0"/>
-          </a:p>
-        </p:txBody>
-      </p:sp>
-      <p:sp>
-        <p:nvSpPr>
-          <p:cNvPr id="5" name="Text Placeholder 2"/>
-          <p:cNvSpPr txBox="1">
-            <a:spLocks/>
-          </p:cNvSpPr>
-          <p:nvPr/>
-        </p:nvSpPr>
-        <p:spPr>
-          <a:xfrm>
-            <a:off x="557530" y="456089"/>
-            <a:ext cx="10515600" cy="458311"/>
-          </a:xfrm>
-          <a:prstGeom prst="rect">
-            <a:avLst/>
-          </a:prstGeom>
-        </p:spPr>
-        <p:txBody>
-          <a:bodyPr vert="horz" lIns="91440" tIns="45720" rIns="91440" bIns="45720" rtlCol="0">
-            <a:normAutofit/>
-          </a:bodyPr>
-          <a:lstStyle>
-            <a:lvl1pPr marL="0" indent="0" algn="l" defTabSz="228508" rtl="0" eaLnBrk="1" latinLnBrk="0" hangingPunct="1">
-              <a:spcBef>
-                <a:spcPct val="20000"/>
-              </a:spcBef>
-              <a:buFont typeface="Arial"/>
-              <a:buNone/>
-              <a:defRPr sz="2400" kern="1200">
-                <a:solidFill>
-                  <a:schemeClr val="tx1">
-                    <a:tint val="75000"/>
-                  </a:schemeClr>
-                </a:solidFill>
-                <a:latin typeface="Roboto Medium"/>
-                <a:ea typeface="+mn-ea"/>
-                <a:cs typeface="+mn-cs"/>
-              </a:defRPr>
-            </a:lvl1pPr>
-            <a:lvl2pPr marL="457200" indent="0" algn="l" defTabSz="228508" rtl="0" eaLnBrk="1" latinLnBrk="0" hangingPunct="1">
-              <a:spcBef>
-                <a:spcPct val="20000"/>
-              </a:spcBef>
-              <a:buSzPct val="60000"/>
-              <a:buFont typeface="Lucida Grande"/>
-              <a:buNone/>
-              <a:defRPr sz="2000" kern="1200">
-                <a:solidFill>
-                  <a:schemeClr val="tx1">
-                    <a:tint val="75000"/>
-                  </a:schemeClr>
-                </a:solidFill>
-                <a:latin typeface="Roboto Medium"/>
-                <a:ea typeface="+mn-ea"/>
-                <a:cs typeface="+mn-cs"/>
-              </a:defRPr>
-            </a:lvl2pPr>
-            <a:lvl3pPr marL="914400" indent="0" algn="l" defTabSz="228508" rtl="0" eaLnBrk="1" latinLnBrk="0" hangingPunct="1">
-              <a:spcBef>
-                <a:spcPct val="20000"/>
-              </a:spcBef>
-              <a:buSzPct val="60000"/>
-              <a:buFont typeface="Lucida Grande"/>
-              <a:buNone/>
-              <a:defRPr sz="1800" kern="1200">
-                <a:solidFill>
-                  <a:schemeClr val="tx1">
-                    <a:tint val="75000"/>
-                  </a:schemeClr>
-                </a:solidFill>
-                <a:latin typeface="Roboto Medium"/>
-                <a:ea typeface="+mn-ea"/>
-                <a:cs typeface="+mn-cs"/>
-              </a:defRPr>
-            </a:lvl3pPr>
-            <a:lvl4pPr marL="1371600" indent="0" algn="l" defTabSz="228508" rtl="0" eaLnBrk="1" latinLnBrk="0" hangingPunct="1">
-              <a:spcBef>
-                <a:spcPct val="20000"/>
-              </a:spcBef>
-              <a:buSzPct val="60000"/>
-              <a:buFont typeface="Lucida Grande"/>
-              <a:buNone/>
-              <a:defRPr sz="1600" kern="1200">
-                <a:solidFill>
-                  <a:schemeClr val="tx1">
-                    <a:tint val="75000"/>
-                  </a:schemeClr>
-                </a:solidFill>
-                <a:latin typeface="Roboto Medium"/>
-                <a:ea typeface="+mn-ea"/>
-                <a:cs typeface="+mn-cs"/>
-              </a:defRPr>
-            </a:lvl4pPr>
-            <a:lvl5pPr marL="1828800" indent="0" algn="l" defTabSz="228508" rtl="0" eaLnBrk="1" latinLnBrk="0" hangingPunct="1">
-              <a:spcBef>
-                <a:spcPct val="20000"/>
-              </a:spcBef>
-              <a:buSzPct val="60000"/>
-              <a:buFont typeface="Lucida Grande"/>
-              <a:buNone/>
-              <a:defRPr sz="1600" kern="1200">
-                <a:solidFill>
-                  <a:schemeClr val="tx1">
-                    <a:tint val="75000"/>
-                  </a:schemeClr>
-                </a:solidFill>
-                <a:latin typeface="Roboto Medium"/>
-                <a:ea typeface="+mn-ea"/>
-                <a:cs typeface="+mn-cs"/>
-              </a:defRPr>
-            </a:lvl5pPr>
-            <a:lvl6pPr marL="2286000" indent="0" algn="l" defTabSz="228508" rtl="0" eaLnBrk="1" latinLnBrk="0" hangingPunct="1">
-              <a:spcBef>
-                <a:spcPct val="20000"/>
-              </a:spcBef>
-              <a:buFont typeface="Arial"/>
-              <a:buNone/>
-              <a:defRPr sz="1600" kern="1200">
-                <a:solidFill>
-                  <a:schemeClr val="tx1">
-                    <a:tint val="75000"/>
-                  </a:schemeClr>
-                </a:solidFill>
-                <a:latin typeface="+mn-lt"/>
-                <a:ea typeface="+mn-ea"/>
-                <a:cs typeface="+mn-cs"/>
-              </a:defRPr>
-            </a:lvl6pPr>
-            <a:lvl7pPr marL="2743200" indent="0" algn="l" defTabSz="228508" rtl="0" eaLnBrk="1" latinLnBrk="0" hangingPunct="1">
-              <a:spcBef>
-                <a:spcPct val="20000"/>
-              </a:spcBef>
-              <a:buFont typeface="Arial"/>
-              <a:buNone/>
-              <a:defRPr sz="1600" kern="1200">
-                <a:solidFill>
-                  <a:schemeClr val="tx1">
-                    <a:tint val="75000"/>
-                  </a:schemeClr>
-                </a:solidFill>
-                <a:latin typeface="+mn-lt"/>
-                <a:ea typeface="+mn-ea"/>
-                <a:cs typeface="+mn-cs"/>
-              </a:defRPr>
-            </a:lvl7pPr>
-            <a:lvl8pPr marL="3200400" indent="0" algn="l" defTabSz="228508" rtl="0" eaLnBrk="1" latinLnBrk="0" hangingPunct="1">
-              <a:spcBef>
-                <a:spcPct val="20000"/>
-              </a:spcBef>
-              <a:buFont typeface="Arial"/>
-              <a:buNone/>
-              <a:defRPr sz="1600" kern="1200">
-                <a:solidFill>
-                  <a:schemeClr val="tx1">
-                    <a:tint val="75000"/>
-                  </a:schemeClr>
-                </a:solidFill>
-                <a:latin typeface="+mn-lt"/>
-                <a:ea typeface="+mn-ea"/>
-                <a:cs typeface="+mn-cs"/>
-              </a:defRPr>
-            </a:lvl8pPr>
-            <a:lvl9pPr marL="3657600" indent="0" algn="l" defTabSz="228508" rtl="0" eaLnBrk="1" latinLnBrk="0" hangingPunct="1">
-              <a:spcBef>
-                <a:spcPct val="20000"/>
-              </a:spcBef>
-              <a:buFont typeface="Arial"/>
-              <a:buNone/>
-              <a:defRPr sz="1600" kern="1200">
-                <a:solidFill>
-                  <a:schemeClr val="tx1">
-                    <a:tint val="75000"/>
-                  </a:schemeClr>
-                </a:solidFill>
-                <a:latin typeface="+mn-lt"/>
-                <a:ea typeface="+mn-ea"/>
-                <a:cs typeface="+mn-cs"/>
-              </a:defRPr>
-            </a:lvl9pPr>
-          </a:lstStyle>
-          <a:p>
-            <a:r>
-              <a:rPr lang="en-US" dirty="0"/>
-              <a:t>Error &amp; Exception Handling</a:t>
-            </a:r>
           </a:p>
         </p:txBody>
       </p:sp>
     </p:spTree>
     <p:extLst>
       <p:ext uri="{BB962C8B-B14F-4D97-AF65-F5344CB8AC3E}">
-        <p14:creationId xmlns:p14="http://schemas.microsoft.com/office/powerpoint/2010/main" val="680280096"/>
+        <p14:creationId xmlns:p14="http://schemas.microsoft.com/office/powerpoint/2010/main" val="493993887"/>
       </p:ext>
     </p:extLst>
   </p:cSld>
@@ -8387,7 +8476,27 @@
             </a:pPr>
             <a:r>
               <a:rPr lang="en-US" dirty="0"/>
-              <a:t>Expanded role-based authentication</a:t>
+              <a:t>Failed form validation returns to appropriate GET method</a:t>
+            </a:r>
+          </a:p>
+          <a:p>
+            <a:pPr marL="800100" lvl="1" indent="-342900">
+              <a:buFontTx/>
+              <a:buChar char="-"/>
+            </a:pPr>
+            <a:r>
+              <a:rPr lang="en-US" dirty="0"/>
+              <a:t>If GET query string carries invalid reference IDs (for DB lookup), exception is handled and returned to GET</a:t>
+            </a:r>
+          </a:p>
+          <a:p>
+            <a:pPr marL="800100" lvl="1" indent="-342900">
+              <a:buFontTx/>
+              <a:buChar char="-"/>
+            </a:pPr>
+            <a:r>
+              <a:rPr lang="en-US" dirty="0"/>
+              <a:t>If POST form data carries invalid reference, exception is handled gracefully</a:t>
             </a:r>
           </a:p>
           <a:p>
@@ -8397,33 +8506,7 @@
             </a:pPr>
             <a:r>
               <a:rPr lang="en-US" dirty="0"/>
-              <a:t>Expanded </a:t>
-            </a:r>
-            <a:r>
-              <a:rPr lang="en-US" dirty="0" err="1"/>
-              <a:t>PartialData.cs</a:t>
-            </a:r>
-            <a:r>
-              <a:rPr lang="en-US" dirty="0"/>
-              <a:t> for </a:t>
-            </a:r>
-            <a:r>
-              <a:rPr lang="en-US" dirty="0" err="1"/>
-              <a:t>SessionData</a:t>
-            </a:r>
-            <a:r>
-              <a:rPr lang="en-US" dirty="0"/>
-              <a:t>:</a:t>
-            </a:r>
-          </a:p>
-          <a:p>
-            <a:pPr marL="800100" lvl="1" indent="-342900">
-              <a:buFontTx/>
-              <a:buChar char="-"/>
-            </a:pPr>
-            <a:r>
-              <a:rPr lang="en-US" dirty="0"/>
-              <a:t>Added simple strings from database to eliminate extra database queries</a:t>
+              <a:t>Changed reference keys to string to prevent easily-manipulated exploitation</a:t>
             </a:r>
           </a:p>
           <a:p>
@@ -8625,7 +8708,7 @@
           <a:p>
             <a:r>
               <a:rPr lang="en-US" dirty="0"/>
-              <a:t>Access Control</a:t>
+              <a:t>Error &amp; Exception Handling</a:t>
             </a:r>
           </a:p>
         </p:txBody>
@@ -8633,7 +8716,7 @@
     </p:spTree>
     <p:extLst>
       <p:ext uri="{BB962C8B-B14F-4D97-AF65-F5344CB8AC3E}">
-        <p14:creationId xmlns:p14="http://schemas.microsoft.com/office/powerpoint/2010/main" val="2625792137"/>
+        <p14:creationId xmlns:p14="http://schemas.microsoft.com/office/powerpoint/2010/main" val="680280096"/>
       </p:ext>
     </p:extLst>
   </p:cSld>
@@ -8688,15 +8771,7 @@
             </a:pPr>
             <a:r>
               <a:rPr lang="en-US" dirty="0"/>
-              <a:t>Improved .</a:t>
-            </a:r>
-            <a:r>
-              <a:rPr lang="en-US" dirty="0" err="1"/>
-              <a:t>css</a:t>
-            </a:r>
-            <a:r>
-              <a:rPr lang="en-US" dirty="0"/>
-              <a:t> to better reflect official TaxSlayer font face, button style, and more</a:t>
+              <a:t>Decommissioning of test EE, Supervisor, and Admin in progress</a:t>
             </a:r>
           </a:p>
           <a:p>
@@ -8706,7 +8781,7 @@
             </a:pPr>
             <a:r>
               <a:rPr lang="en-US" dirty="0"/>
-              <a:t>Across the board changes</a:t>
+              <a:t>Current implementation in need of much more test data (TODO)</a:t>
             </a:r>
           </a:p>
           <a:p>
@@ -8715,31 +8790,16 @@
               <a:buChar char="-"/>
             </a:pPr>
             <a:r>
-              <a:rPr lang="en-US" dirty="0" err="1"/>
-              <a:t>DateTime</a:t>
-            </a:r>
-            <a:r>
-              <a:rPr lang="en-US" dirty="0"/>
-              <a:t> objects have been pretty-printed</a:t>
-            </a:r>
-          </a:p>
-          <a:p>
-            <a:pPr marL="342900" indent="-342900">
+              <a:rPr lang="en-US" dirty="0"/>
+              <a:t>Presentation is lacking real production data</a:t>
+            </a:r>
+          </a:p>
+          <a:p>
+            <a:pPr marL="1257300" lvl="2" indent="-342900">
               <a:buFontTx/>
               <a:buChar char="-"/>
             </a:pPr>
-            <a:r>
-              <a:rPr lang="en-US" dirty="0"/>
-              <a:t>TaxSlayer favicon .</a:t>
-            </a:r>
-            <a:r>
-              <a:rPr lang="en-US" dirty="0" err="1"/>
-              <a:t>ico</a:t>
-            </a:r>
-            <a:r>
-              <a:rPr lang="en-US" dirty="0"/>
-              <a:t> added</a:t>
-            </a:r>
+            <a:endParaRPr lang="en-US" dirty="0"/>
           </a:p>
           <a:p>
             <a:pPr marL="1257300" lvl="2" indent="-342900">
@@ -8933,20 +8993,15 @@
           <a:p>
             <a:r>
               <a:rPr lang="en-US" dirty="0"/>
-              <a:t>Views, HTML, and .</a:t>
-            </a:r>
-            <a:r>
-              <a:rPr lang="en-US" dirty="0" err="1"/>
-              <a:t>css</a:t>
-            </a:r>
-            <a:endParaRPr lang="en-US" dirty="0"/>
+              <a:t>Database</a:t>
+            </a:r>
           </a:p>
         </p:txBody>
       </p:sp>
     </p:spTree>
     <p:extLst>
       <p:ext uri="{BB962C8B-B14F-4D97-AF65-F5344CB8AC3E}">
-        <p14:creationId xmlns:p14="http://schemas.microsoft.com/office/powerpoint/2010/main" val="849367812"/>
+        <p14:creationId xmlns:p14="http://schemas.microsoft.com/office/powerpoint/2010/main" val="2512726285"/>
       </p:ext>
     </p:extLst>
   </p:cSld>
@@ -8975,28 +9030,6 @@
       </p:grpSpPr>
       <p:sp>
         <p:nvSpPr>
-          <p:cNvPr id="2" name="Title 1"/>
-          <p:cNvSpPr>
-            <a:spLocks noGrp="1"/>
-          </p:cNvSpPr>
-          <p:nvPr>
-            <p:ph type="title"/>
-          </p:nvPr>
-        </p:nvSpPr>
-        <p:spPr/>
-        <p:txBody>
-          <a:bodyPr/>
-          <a:lstStyle/>
-          <a:p>
-            <a:r>
-              <a:rPr lang="en-US" cap="none" dirty="0"/>
-              <a:t>TODO</a:t>
-            </a:r>
-          </a:p>
-        </p:txBody>
-      </p:sp>
-      <p:sp>
-        <p:nvSpPr>
           <p:cNvPr id="3" name="Text Placeholder 2"/>
           <p:cNvSpPr>
             <a:spLocks noGrp="1"/>
@@ -9005,19 +9038,271 @@
             <p:ph type="body" idx="1"/>
           </p:nvPr>
         </p:nvSpPr>
-        <p:spPr/>
-        <p:txBody>
-          <a:bodyPr/>
+        <p:spPr>
+          <a:xfrm>
+            <a:off x="557530" y="1160463"/>
+            <a:ext cx="10515600" cy="5179377"/>
+          </a:xfrm>
+        </p:spPr>
+        <p:txBody>
+          <a:bodyPr>
+            <a:normAutofit/>
+          </a:bodyPr>
           <a:lstStyle/>
           <a:p>
+            <a:pPr marL="342900" indent="-342900">
+              <a:buFontTx/>
+              <a:buChar char="-"/>
+            </a:pPr>
+            <a:r>
+              <a:rPr lang="en-US" dirty="0"/>
+              <a:t>Expanded role-based authentication</a:t>
+            </a:r>
+          </a:p>
+          <a:p>
+            <a:pPr marL="342900" indent="-342900">
+              <a:buFontTx/>
+              <a:buChar char="-"/>
+            </a:pPr>
+            <a:r>
+              <a:rPr lang="en-US" dirty="0"/>
+              <a:t>Expanded </a:t>
+            </a:r>
+            <a:r>
+              <a:rPr lang="en-US" dirty="0" err="1"/>
+              <a:t>PartialData.cs</a:t>
+            </a:r>
+            <a:r>
+              <a:rPr lang="en-US" dirty="0"/>
+              <a:t> for </a:t>
+            </a:r>
+            <a:r>
+              <a:rPr lang="en-US" dirty="0" err="1"/>
+              <a:t>SessionData</a:t>
+            </a:r>
+            <a:r>
+              <a:rPr lang="en-US" dirty="0"/>
+              <a:t>:</a:t>
+            </a:r>
+          </a:p>
+          <a:p>
+            <a:pPr marL="800100" lvl="1" indent="-342900">
+              <a:buFontTx/>
+              <a:buChar char="-"/>
+            </a:pPr>
+            <a:r>
+              <a:rPr lang="en-US" dirty="0"/>
+              <a:t>Added simple strings from database to eliminate extra database queries</a:t>
+            </a:r>
+          </a:p>
+          <a:p>
+            <a:pPr marL="1257300" lvl="2" indent="-342900">
+              <a:buFontTx/>
+              <a:buChar char="-"/>
+            </a:pPr>
             <a:endParaRPr lang="en-US" dirty="0"/>
+          </a:p>
+          <a:p>
+            <a:pPr marL="1257300" lvl="2" indent="-342900">
+              <a:buFontTx/>
+              <a:buChar char="-"/>
+            </a:pPr>
+            <a:endParaRPr lang="en-US" dirty="0"/>
+          </a:p>
+        </p:txBody>
+      </p:sp>
+      <p:sp>
+        <p:nvSpPr>
+          <p:cNvPr id="5" name="Text Placeholder 2"/>
+          <p:cNvSpPr txBox="1">
+            <a:spLocks/>
+          </p:cNvSpPr>
+          <p:nvPr/>
+        </p:nvSpPr>
+        <p:spPr>
+          <a:xfrm>
+            <a:off x="557530" y="456089"/>
+            <a:ext cx="10515600" cy="458311"/>
+          </a:xfrm>
+          <a:prstGeom prst="rect">
+            <a:avLst/>
+          </a:prstGeom>
+        </p:spPr>
+        <p:txBody>
+          <a:bodyPr vert="horz" lIns="91440" tIns="45720" rIns="91440" bIns="45720" rtlCol="0">
+            <a:normAutofit/>
+          </a:bodyPr>
+          <a:lstStyle>
+            <a:lvl1pPr marL="0" indent="0" algn="l" defTabSz="228508" rtl="0" eaLnBrk="1" latinLnBrk="0" hangingPunct="1">
+              <a:spcBef>
+                <a:spcPct val="20000"/>
+              </a:spcBef>
+              <a:buFont typeface="Arial"/>
+              <a:buNone/>
+              <a:defRPr sz="2400" kern="1200">
+                <a:solidFill>
+                  <a:schemeClr val="tx1">
+                    <a:tint val="75000"/>
+                  </a:schemeClr>
+                </a:solidFill>
+                <a:latin typeface="Roboto Medium"/>
+                <a:ea typeface="+mn-ea"/>
+                <a:cs typeface="+mn-cs"/>
+              </a:defRPr>
+            </a:lvl1pPr>
+            <a:lvl2pPr marL="457200" indent="0" algn="l" defTabSz="228508" rtl="0" eaLnBrk="1" latinLnBrk="0" hangingPunct="1">
+              <a:spcBef>
+                <a:spcPct val="20000"/>
+              </a:spcBef>
+              <a:buSzPct val="60000"/>
+              <a:buFont typeface="Lucida Grande"/>
+              <a:buNone/>
+              <a:defRPr sz="2000" kern="1200">
+                <a:solidFill>
+                  <a:schemeClr val="tx1">
+                    <a:tint val="75000"/>
+                  </a:schemeClr>
+                </a:solidFill>
+                <a:latin typeface="Roboto Medium"/>
+                <a:ea typeface="+mn-ea"/>
+                <a:cs typeface="+mn-cs"/>
+              </a:defRPr>
+            </a:lvl2pPr>
+            <a:lvl3pPr marL="914400" indent="0" algn="l" defTabSz="228508" rtl="0" eaLnBrk="1" latinLnBrk="0" hangingPunct="1">
+              <a:spcBef>
+                <a:spcPct val="20000"/>
+              </a:spcBef>
+              <a:buSzPct val="60000"/>
+              <a:buFont typeface="Lucida Grande"/>
+              <a:buNone/>
+              <a:defRPr sz="1800" kern="1200">
+                <a:solidFill>
+                  <a:schemeClr val="tx1">
+                    <a:tint val="75000"/>
+                  </a:schemeClr>
+                </a:solidFill>
+                <a:latin typeface="Roboto Medium"/>
+                <a:ea typeface="+mn-ea"/>
+                <a:cs typeface="+mn-cs"/>
+              </a:defRPr>
+            </a:lvl3pPr>
+            <a:lvl4pPr marL="1371600" indent="0" algn="l" defTabSz="228508" rtl="0" eaLnBrk="1" latinLnBrk="0" hangingPunct="1">
+              <a:spcBef>
+                <a:spcPct val="20000"/>
+              </a:spcBef>
+              <a:buSzPct val="60000"/>
+              <a:buFont typeface="Lucida Grande"/>
+              <a:buNone/>
+              <a:defRPr sz="1600" kern="1200">
+                <a:solidFill>
+                  <a:schemeClr val="tx1">
+                    <a:tint val="75000"/>
+                  </a:schemeClr>
+                </a:solidFill>
+                <a:latin typeface="Roboto Medium"/>
+                <a:ea typeface="+mn-ea"/>
+                <a:cs typeface="+mn-cs"/>
+              </a:defRPr>
+            </a:lvl4pPr>
+            <a:lvl5pPr marL="1828800" indent="0" algn="l" defTabSz="228508" rtl="0" eaLnBrk="1" latinLnBrk="0" hangingPunct="1">
+              <a:spcBef>
+                <a:spcPct val="20000"/>
+              </a:spcBef>
+              <a:buSzPct val="60000"/>
+              <a:buFont typeface="Lucida Grande"/>
+              <a:buNone/>
+              <a:defRPr sz="1600" kern="1200">
+                <a:solidFill>
+                  <a:schemeClr val="tx1">
+                    <a:tint val="75000"/>
+                  </a:schemeClr>
+                </a:solidFill>
+                <a:latin typeface="Roboto Medium"/>
+                <a:ea typeface="+mn-ea"/>
+                <a:cs typeface="+mn-cs"/>
+              </a:defRPr>
+            </a:lvl5pPr>
+            <a:lvl6pPr marL="2286000" indent="0" algn="l" defTabSz="228508" rtl="0" eaLnBrk="1" latinLnBrk="0" hangingPunct="1">
+              <a:spcBef>
+                <a:spcPct val="20000"/>
+              </a:spcBef>
+              <a:buFont typeface="Arial"/>
+              <a:buNone/>
+              <a:defRPr sz="1600" kern="1200">
+                <a:solidFill>
+                  <a:schemeClr val="tx1">
+                    <a:tint val="75000"/>
+                  </a:schemeClr>
+                </a:solidFill>
+                <a:latin typeface="+mn-lt"/>
+                <a:ea typeface="+mn-ea"/>
+                <a:cs typeface="+mn-cs"/>
+              </a:defRPr>
+            </a:lvl6pPr>
+            <a:lvl7pPr marL="2743200" indent="0" algn="l" defTabSz="228508" rtl="0" eaLnBrk="1" latinLnBrk="0" hangingPunct="1">
+              <a:spcBef>
+                <a:spcPct val="20000"/>
+              </a:spcBef>
+              <a:buFont typeface="Arial"/>
+              <a:buNone/>
+              <a:defRPr sz="1600" kern="1200">
+                <a:solidFill>
+                  <a:schemeClr val="tx1">
+                    <a:tint val="75000"/>
+                  </a:schemeClr>
+                </a:solidFill>
+                <a:latin typeface="+mn-lt"/>
+                <a:ea typeface="+mn-ea"/>
+                <a:cs typeface="+mn-cs"/>
+              </a:defRPr>
+            </a:lvl7pPr>
+            <a:lvl8pPr marL="3200400" indent="0" algn="l" defTabSz="228508" rtl="0" eaLnBrk="1" latinLnBrk="0" hangingPunct="1">
+              <a:spcBef>
+                <a:spcPct val="20000"/>
+              </a:spcBef>
+              <a:buFont typeface="Arial"/>
+              <a:buNone/>
+              <a:defRPr sz="1600" kern="1200">
+                <a:solidFill>
+                  <a:schemeClr val="tx1">
+                    <a:tint val="75000"/>
+                  </a:schemeClr>
+                </a:solidFill>
+                <a:latin typeface="+mn-lt"/>
+                <a:ea typeface="+mn-ea"/>
+                <a:cs typeface="+mn-cs"/>
+              </a:defRPr>
+            </a:lvl8pPr>
+            <a:lvl9pPr marL="3657600" indent="0" algn="l" defTabSz="228508" rtl="0" eaLnBrk="1" latinLnBrk="0" hangingPunct="1">
+              <a:spcBef>
+                <a:spcPct val="20000"/>
+              </a:spcBef>
+              <a:buFont typeface="Arial"/>
+              <a:buNone/>
+              <a:defRPr sz="1600" kern="1200">
+                <a:solidFill>
+                  <a:schemeClr val="tx1">
+                    <a:tint val="75000"/>
+                  </a:schemeClr>
+                </a:solidFill>
+                <a:latin typeface="+mn-lt"/>
+                <a:ea typeface="+mn-ea"/>
+                <a:cs typeface="+mn-cs"/>
+              </a:defRPr>
+            </a:lvl9pPr>
+          </a:lstStyle>
+          <a:p>
+            <a:r>
+              <a:rPr lang="en-US" dirty="0"/>
+              <a:t>Access Control</a:t>
+            </a:r>
           </a:p>
         </p:txBody>
       </p:sp>
     </p:spTree>
     <p:extLst>
       <p:ext uri="{BB962C8B-B14F-4D97-AF65-F5344CB8AC3E}">
-        <p14:creationId xmlns:p14="http://schemas.microsoft.com/office/powerpoint/2010/main" val="809178676"/>
+        <p14:creationId xmlns:p14="http://schemas.microsoft.com/office/powerpoint/2010/main" val="2625792137"/>
       </p:ext>
     </p:extLst>
   </p:cSld>
@@ -9072,15 +9357,58 @@
             </a:pPr>
             <a:r>
               <a:rPr lang="en-US" dirty="0"/>
-              <a:t>Working prototype binds data to JavaScript library presentation</a:t>
-            </a:r>
-          </a:p>
-          <a:p>
-            <a:pPr marL="1257300" lvl="2" indent="-342900">
+              <a:t>Improved .</a:t>
+            </a:r>
+            <a:r>
+              <a:rPr lang="en-US" dirty="0" err="1"/>
+              <a:t>css</a:t>
+            </a:r>
+            <a:r>
+              <a:rPr lang="en-US" dirty="0"/>
+              <a:t> to better reflect official TaxSlayer font face, button style, and more</a:t>
+            </a:r>
+          </a:p>
+          <a:p>
+            <a:pPr marL="342900" indent="-342900">
               <a:buFontTx/>
               <a:buChar char="-"/>
             </a:pPr>
-            <a:endParaRPr lang="en-US" dirty="0"/>
+            <a:r>
+              <a:rPr lang="en-US" dirty="0"/>
+              <a:t>Across the board changes</a:t>
+            </a:r>
+          </a:p>
+          <a:p>
+            <a:pPr marL="342900" indent="-342900">
+              <a:buFontTx/>
+              <a:buChar char="-"/>
+            </a:pPr>
+            <a:r>
+              <a:rPr lang="en-US" dirty="0" err="1"/>
+              <a:t>DateTime</a:t>
+            </a:r>
+            <a:r>
+              <a:rPr lang="en-US" dirty="0"/>
+              <a:t> objects have been pretty-printed</a:t>
+            </a:r>
+          </a:p>
+          <a:p>
+            <a:pPr marL="342900" indent="-342900">
+              <a:buFontTx/>
+              <a:buChar char="-"/>
+            </a:pPr>
+            <a:r>
+              <a:rPr lang="en-US" dirty="0"/>
+              <a:t>TaxSlayer favicon .</a:t>
+            </a:r>
+            <a:r>
+              <a:rPr lang="en-US" dirty="0" err="1"/>
+              <a:t>ico</a:t>
+            </a:r>
+            <a:r>
+              <a:rPr lang="en-US" dirty="0"/>
+              <a:t> added</a:t>
+            </a:r>
           </a:p>
           <a:p>
             <a:pPr marL="1257300" lvl="2" indent="-342900">
@@ -9273,20 +9601,92 @@
           </a:lstStyle>
           <a:p>
             <a:r>
+              <a:rPr lang="en-US" dirty="0"/>
+              <a:t>Views, HTML, and .</a:t>
+            </a:r>
+            <a:r>
               <a:rPr lang="en-US" dirty="0" err="1"/>
-              <a:t>ViewReport</a:t>
-            </a:r>
-            <a:r>
-              <a:rPr lang="en-US" dirty="0"/>
-              <a:t> Data Presentation</a:t>
-            </a:r>
+              <a:t>css</a:t>
+            </a:r>
+            <a:endParaRPr lang="en-US" dirty="0"/>
           </a:p>
         </p:txBody>
       </p:sp>
     </p:spTree>
     <p:extLst>
       <p:ext uri="{BB962C8B-B14F-4D97-AF65-F5344CB8AC3E}">
-        <p14:creationId xmlns:p14="http://schemas.microsoft.com/office/powerpoint/2010/main" val="1396735046"/>
+        <p14:creationId xmlns:p14="http://schemas.microsoft.com/office/powerpoint/2010/main" val="849367812"/>
+      </p:ext>
+    </p:extLst>
+  </p:cSld>
+  <p:clrMapOvr>
+    <a:masterClrMapping/>
+  </p:clrMapOvr>
+</p:sld>
+</file>
+
+<file path=ppt/slides/slide19.xml><?xml version="1.0" encoding="utf-8"?>
+<p:sld xmlns:a="http://schemas.openxmlformats.org/drawingml/2006/main" xmlns:r="http://schemas.openxmlformats.org/officeDocument/2006/relationships" xmlns:p="http://schemas.openxmlformats.org/presentationml/2006/main">
+  <p:cSld>
+    <p:spTree>
+      <p:nvGrpSpPr>
+        <p:cNvPr id="1" name=""/>
+        <p:cNvGrpSpPr/>
+        <p:nvPr/>
+      </p:nvGrpSpPr>
+      <p:grpSpPr>
+        <a:xfrm>
+          <a:off x="0" y="0"/>
+          <a:ext cx="0" cy="0"/>
+          <a:chOff x="0" y="0"/>
+          <a:chExt cx="0" cy="0"/>
+        </a:xfrm>
+      </p:grpSpPr>
+      <p:sp>
+        <p:nvSpPr>
+          <p:cNvPr id="2" name="Title 1"/>
+          <p:cNvSpPr>
+            <a:spLocks noGrp="1"/>
+          </p:cNvSpPr>
+          <p:nvPr>
+            <p:ph type="title"/>
+          </p:nvPr>
+        </p:nvSpPr>
+        <p:spPr/>
+        <p:txBody>
+          <a:bodyPr/>
+          <a:lstStyle/>
+          <a:p>
+            <a:r>
+              <a:rPr lang="en-US" cap="none" dirty="0"/>
+              <a:t>TODO</a:t>
+            </a:r>
+          </a:p>
+        </p:txBody>
+      </p:sp>
+      <p:sp>
+        <p:nvSpPr>
+          <p:cNvPr id="3" name="Text Placeholder 2"/>
+          <p:cNvSpPr>
+            <a:spLocks noGrp="1"/>
+          </p:cNvSpPr>
+          <p:nvPr>
+            <p:ph type="body" idx="1"/>
+          </p:nvPr>
+        </p:nvSpPr>
+        <p:spPr/>
+        <p:txBody>
+          <a:bodyPr/>
+          <a:lstStyle/>
+          <a:p>
+            <a:endParaRPr lang="en-US" dirty="0"/>
+          </a:p>
+        </p:txBody>
+      </p:sp>
+    </p:spTree>
+    <p:extLst>
+      <p:ext uri="{BB962C8B-B14F-4D97-AF65-F5344CB8AC3E}">
+        <p14:creationId xmlns:p14="http://schemas.microsoft.com/office/powerpoint/2010/main" val="809178676"/>
       </p:ext>
     </p:extLst>
   </p:cSld>
@@ -9388,6 +9788,309 @@
     <p:extLst>
       <p:ext uri="{BB962C8B-B14F-4D97-AF65-F5344CB8AC3E}">
         <p14:creationId xmlns:p14="http://schemas.microsoft.com/office/powerpoint/2010/main" val="2010492910"/>
+      </p:ext>
+    </p:extLst>
+  </p:cSld>
+  <p:clrMapOvr>
+    <a:masterClrMapping/>
+  </p:clrMapOvr>
+</p:sld>
+</file>
+
+<file path=ppt/slides/slide20.xml><?xml version="1.0" encoding="utf-8"?>
+<p:sld xmlns:a="http://schemas.openxmlformats.org/drawingml/2006/main" xmlns:r="http://schemas.openxmlformats.org/officeDocument/2006/relationships" xmlns:p="http://schemas.openxmlformats.org/presentationml/2006/main">
+  <p:cSld>
+    <p:spTree>
+      <p:nvGrpSpPr>
+        <p:cNvPr id="1" name=""/>
+        <p:cNvGrpSpPr/>
+        <p:nvPr/>
+      </p:nvGrpSpPr>
+      <p:grpSpPr>
+        <a:xfrm>
+          <a:off x="0" y="0"/>
+          <a:ext cx="0" cy="0"/>
+          <a:chOff x="0" y="0"/>
+          <a:chExt cx="0" cy="0"/>
+        </a:xfrm>
+      </p:grpSpPr>
+      <p:sp>
+        <p:nvSpPr>
+          <p:cNvPr id="3" name="Text Placeholder 2"/>
+          <p:cNvSpPr>
+            <a:spLocks noGrp="1"/>
+          </p:cNvSpPr>
+          <p:nvPr>
+            <p:ph type="body" idx="1"/>
+          </p:nvPr>
+        </p:nvSpPr>
+        <p:spPr>
+          <a:xfrm>
+            <a:off x="557530" y="1160463"/>
+            <a:ext cx="10515600" cy="5179377"/>
+          </a:xfrm>
+        </p:spPr>
+        <p:txBody>
+          <a:bodyPr>
+            <a:normAutofit/>
+          </a:bodyPr>
+          <a:lstStyle/>
+          <a:p>
+            <a:pPr marL="342900" indent="-342900">
+              <a:buFontTx/>
+              <a:buChar char="-"/>
+            </a:pPr>
+            <a:r>
+              <a:rPr lang="en-US" dirty="0"/>
+              <a:t>Working prototype binds data to JavaScript library presentation</a:t>
+            </a:r>
+          </a:p>
+          <a:p>
+            <a:pPr marL="800100" lvl="1" indent="-342900">
+              <a:buFontTx/>
+              <a:buChar char="-"/>
+            </a:pPr>
+            <a:r>
+              <a:rPr lang="en-US" dirty="0"/>
+              <a:t>Sortable lists in a separate branch</a:t>
+            </a:r>
+          </a:p>
+          <a:p>
+            <a:pPr marL="342900" indent="-342900">
+              <a:buFontTx/>
+              <a:buChar char="-"/>
+            </a:pPr>
+            <a:r>
+              <a:rPr lang="en-US" dirty="0"/>
+              <a:t>Research on best graphical JavaScript library for infographic display</a:t>
+            </a:r>
+          </a:p>
+          <a:p>
+            <a:pPr marL="342900" indent="-342900">
+              <a:buFontTx/>
+              <a:buChar char="-"/>
+            </a:pPr>
+            <a:r>
+              <a:rPr lang="en-US" dirty="0" err="1"/>
+              <a:t>AddCategories</a:t>
+            </a:r>
+            <a:r>
+              <a:rPr lang="en-US" dirty="0"/>
+              <a:t> (Supervisor &amp; Administrator function), which will include modifying existing categories</a:t>
+            </a:r>
+          </a:p>
+          <a:p>
+            <a:pPr marL="1257300" lvl="2" indent="-342900">
+              <a:buFontTx/>
+              <a:buChar char="-"/>
+            </a:pPr>
+            <a:endParaRPr lang="en-US" dirty="0"/>
+          </a:p>
+          <a:p>
+            <a:pPr marL="1257300" lvl="2" indent="-342900">
+              <a:buFontTx/>
+              <a:buChar char="-"/>
+            </a:pPr>
+            <a:endParaRPr lang="en-US" dirty="0"/>
+          </a:p>
+        </p:txBody>
+      </p:sp>
+      <p:sp>
+        <p:nvSpPr>
+          <p:cNvPr id="5" name="Text Placeholder 2"/>
+          <p:cNvSpPr txBox="1">
+            <a:spLocks/>
+          </p:cNvSpPr>
+          <p:nvPr/>
+        </p:nvSpPr>
+        <p:spPr>
+          <a:xfrm>
+            <a:off x="557530" y="456089"/>
+            <a:ext cx="10515600" cy="458311"/>
+          </a:xfrm>
+          <a:prstGeom prst="rect">
+            <a:avLst/>
+          </a:prstGeom>
+        </p:spPr>
+        <p:txBody>
+          <a:bodyPr vert="horz" lIns="91440" tIns="45720" rIns="91440" bIns="45720" rtlCol="0">
+            <a:normAutofit/>
+          </a:bodyPr>
+          <a:lstStyle>
+            <a:lvl1pPr marL="0" indent="0" algn="l" defTabSz="228508" rtl="0" eaLnBrk="1" latinLnBrk="0" hangingPunct="1">
+              <a:spcBef>
+                <a:spcPct val="20000"/>
+              </a:spcBef>
+              <a:buFont typeface="Arial"/>
+              <a:buNone/>
+              <a:defRPr sz="2400" kern="1200">
+                <a:solidFill>
+                  <a:schemeClr val="tx1">
+                    <a:tint val="75000"/>
+                  </a:schemeClr>
+                </a:solidFill>
+                <a:latin typeface="Roboto Medium"/>
+                <a:ea typeface="+mn-ea"/>
+                <a:cs typeface="+mn-cs"/>
+              </a:defRPr>
+            </a:lvl1pPr>
+            <a:lvl2pPr marL="457200" indent="0" algn="l" defTabSz="228508" rtl="0" eaLnBrk="1" latinLnBrk="0" hangingPunct="1">
+              <a:spcBef>
+                <a:spcPct val="20000"/>
+              </a:spcBef>
+              <a:buSzPct val="60000"/>
+              <a:buFont typeface="Lucida Grande"/>
+              <a:buNone/>
+              <a:defRPr sz="2000" kern="1200">
+                <a:solidFill>
+                  <a:schemeClr val="tx1">
+                    <a:tint val="75000"/>
+                  </a:schemeClr>
+                </a:solidFill>
+                <a:latin typeface="Roboto Medium"/>
+                <a:ea typeface="+mn-ea"/>
+                <a:cs typeface="+mn-cs"/>
+              </a:defRPr>
+            </a:lvl2pPr>
+            <a:lvl3pPr marL="914400" indent="0" algn="l" defTabSz="228508" rtl="0" eaLnBrk="1" latinLnBrk="0" hangingPunct="1">
+              <a:spcBef>
+                <a:spcPct val="20000"/>
+              </a:spcBef>
+              <a:buSzPct val="60000"/>
+              <a:buFont typeface="Lucida Grande"/>
+              <a:buNone/>
+              <a:defRPr sz="1800" kern="1200">
+                <a:solidFill>
+                  <a:schemeClr val="tx1">
+                    <a:tint val="75000"/>
+                  </a:schemeClr>
+                </a:solidFill>
+                <a:latin typeface="Roboto Medium"/>
+                <a:ea typeface="+mn-ea"/>
+                <a:cs typeface="+mn-cs"/>
+              </a:defRPr>
+            </a:lvl3pPr>
+            <a:lvl4pPr marL="1371600" indent="0" algn="l" defTabSz="228508" rtl="0" eaLnBrk="1" latinLnBrk="0" hangingPunct="1">
+              <a:spcBef>
+                <a:spcPct val="20000"/>
+              </a:spcBef>
+              <a:buSzPct val="60000"/>
+              <a:buFont typeface="Lucida Grande"/>
+              <a:buNone/>
+              <a:defRPr sz="1600" kern="1200">
+                <a:solidFill>
+                  <a:schemeClr val="tx1">
+                    <a:tint val="75000"/>
+                  </a:schemeClr>
+                </a:solidFill>
+                <a:latin typeface="Roboto Medium"/>
+                <a:ea typeface="+mn-ea"/>
+                <a:cs typeface="+mn-cs"/>
+              </a:defRPr>
+            </a:lvl4pPr>
+            <a:lvl5pPr marL="1828800" indent="0" algn="l" defTabSz="228508" rtl="0" eaLnBrk="1" latinLnBrk="0" hangingPunct="1">
+              <a:spcBef>
+                <a:spcPct val="20000"/>
+              </a:spcBef>
+              <a:buSzPct val="60000"/>
+              <a:buFont typeface="Lucida Grande"/>
+              <a:buNone/>
+              <a:defRPr sz="1600" kern="1200">
+                <a:solidFill>
+                  <a:schemeClr val="tx1">
+                    <a:tint val="75000"/>
+                  </a:schemeClr>
+                </a:solidFill>
+                <a:latin typeface="Roboto Medium"/>
+                <a:ea typeface="+mn-ea"/>
+                <a:cs typeface="+mn-cs"/>
+              </a:defRPr>
+            </a:lvl5pPr>
+            <a:lvl6pPr marL="2286000" indent="0" algn="l" defTabSz="228508" rtl="0" eaLnBrk="1" latinLnBrk="0" hangingPunct="1">
+              <a:spcBef>
+                <a:spcPct val="20000"/>
+              </a:spcBef>
+              <a:buFont typeface="Arial"/>
+              <a:buNone/>
+              <a:defRPr sz="1600" kern="1200">
+                <a:solidFill>
+                  <a:schemeClr val="tx1">
+                    <a:tint val="75000"/>
+                  </a:schemeClr>
+                </a:solidFill>
+                <a:latin typeface="+mn-lt"/>
+                <a:ea typeface="+mn-ea"/>
+                <a:cs typeface="+mn-cs"/>
+              </a:defRPr>
+            </a:lvl6pPr>
+            <a:lvl7pPr marL="2743200" indent="0" algn="l" defTabSz="228508" rtl="0" eaLnBrk="1" latinLnBrk="0" hangingPunct="1">
+              <a:spcBef>
+                <a:spcPct val="20000"/>
+              </a:spcBef>
+              <a:buFont typeface="Arial"/>
+              <a:buNone/>
+              <a:defRPr sz="1600" kern="1200">
+                <a:solidFill>
+                  <a:schemeClr val="tx1">
+                    <a:tint val="75000"/>
+                  </a:schemeClr>
+                </a:solidFill>
+                <a:latin typeface="+mn-lt"/>
+                <a:ea typeface="+mn-ea"/>
+                <a:cs typeface="+mn-cs"/>
+              </a:defRPr>
+            </a:lvl7pPr>
+            <a:lvl8pPr marL="3200400" indent="0" algn="l" defTabSz="228508" rtl="0" eaLnBrk="1" latinLnBrk="0" hangingPunct="1">
+              <a:spcBef>
+                <a:spcPct val="20000"/>
+              </a:spcBef>
+              <a:buFont typeface="Arial"/>
+              <a:buNone/>
+              <a:defRPr sz="1600" kern="1200">
+                <a:solidFill>
+                  <a:schemeClr val="tx1">
+                    <a:tint val="75000"/>
+                  </a:schemeClr>
+                </a:solidFill>
+                <a:latin typeface="+mn-lt"/>
+                <a:ea typeface="+mn-ea"/>
+                <a:cs typeface="+mn-cs"/>
+              </a:defRPr>
+            </a:lvl8pPr>
+            <a:lvl9pPr marL="3657600" indent="0" algn="l" defTabSz="228508" rtl="0" eaLnBrk="1" latinLnBrk="0" hangingPunct="1">
+              <a:spcBef>
+                <a:spcPct val="20000"/>
+              </a:spcBef>
+              <a:buFont typeface="Arial"/>
+              <a:buNone/>
+              <a:defRPr sz="1600" kern="1200">
+                <a:solidFill>
+                  <a:schemeClr val="tx1">
+                    <a:tint val="75000"/>
+                  </a:schemeClr>
+                </a:solidFill>
+                <a:latin typeface="+mn-lt"/>
+                <a:ea typeface="+mn-ea"/>
+                <a:cs typeface="+mn-cs"/>
+              </a:defRPr>
+            </a:lvl9pPr>
+          </a:lstStyle>
+          <a:p>
+            <a:r>
+              <a:rPr lang="en-US" dirty="0" err="1"/>
+              <a:t>ViewReport</a:t>
+            </a:r>
+            <a:r>
+              <a:rPr lang="en-US" dirty="0"/>
+              <a:t> Data Presentation</a:t>
+            </a:r>
+          </a:p>
+        </p:txBody>
+      </p:sp>
+    </p:spTree>
+    <p:extLst>
+      <p:ext uri="{BB962C8B-B14F-4D97-AF65-F5344CB8AC3E}">
+        <p14:creationId xmlns:p14="http://schemas.microsoft.com/office/powerpoint/2010/main" val="1396735046"/>
       </p:ext>
     </p:extLst>
   </p:cSld>
@@ -10333,7 +11036,7 @@
             </a:pPr>
             <a:r>
               <a:rPr lang="en-US" dirty="0"/>
-              <a:t>Prioritizes managed Employees’ submitted Goals</a:t>
+              <a:t>Lists Employees’ Goals that are pending approval</a:t>
             </a:r>
           </a:p>
         </p:txBody>
@@ -10386,7 +11089,7 @@
         </p:spPr>
         <p:txBody>
           <a:bodyPr>
-            <a:normAutofit/>
+            <a:normAutofit lnSpcReduction="10000"/>
           </a:bodyPr>
           <a:lstStyle/>
           <a:p>
@@ -10396,7 +11099,7 @@
             </a:pPr>
             <a:r>
               <a:rPr lang="en-US" dirty="0"/>
-              <a:t>Updated:</a:t>
+              <a:t>Implemented:</a:t>
             </a:r>
           </a:p>
           <a:p>
@@ -10406,28 +11109,71 @@
             </a:pPr>
             <a:r>
               <a:rPr lang="en-US" dirty="0"/>
-              <a:t>Removal of test data</a:t>
-            </a:r>
-          </a:p>
-          <a:p>
-            <a:pPr marL="800100" lvl="1" indent="-342900">
+              <a:t>Query database for:</a:t>
+            </a:r>
+          </a:p>
+          <a:p>
+            <a:pPr marL="1257300" lvl="2" indent="-342900">
               <a:buFontTx/>
               <a:buChar char="-"/>
             </a:pPr>
             <a:r>
               <a:rPr lang="en-US" dirty="0"/>
-              <a:t>Removal of unnecessary hard-coded form data</a:t>
-            </a:r>
-          </a:p>
-          <a:p>
-            <a:pPr marL="800100" lvl="1" indent="-342900">
+              <a:t>Managed Employees’ Goals (Dictionary&lt;</a:t>
+            </a:r>
+            <a:r>
+              <a:rPr lang="en-US" dirty="0" err="1"/>
+              <a:t>int,List</a:t>
+            </a:r>
+            <a:r>
+              <a:rPr lang="en-US" dirty="0"/>
+              <a:t>&lt;Goal&gt;&gt;)</a:t>
+            </a:r>
+          </a:p>
+          <a:p>
+            <a:pPr marL="1257300" lvl="2" indent="-342900">
               <a:buFontTx/>
               <a:buChar char="-"/>
             </a:pPr>
             <a:r>
               <a:rPr lang="en-US" dirty="0"/>
-              <a:t>Correctly pulling available Supervisors to assign Dept. Supervisor</a:t>
-            </a:r>
+              <a:t>Each Goal’s Updates (Dictionary &lt;</a:t>
+            </a:r>
+            <a:r>
+              <a:rPr lang="en-US" dirty="0" err="1"/>
+              <a:t>int,List</a:t>
+            </a:r>
+            <a:r>
+              <a:rPr lang="en-US" dirty="0"/>
+              <a:t>&lt;Update&gt;&gt;)</a:t>
+            </a:r>
+          </a:p>
+          <a:p>
+            <a:pPr marL="1257300" lvl="2" indent="-342900">
+              <a:buFontTx/>
+              <a:buChar char="-"/>
+            </a:pPr>
+            <a:r>
+              <a:rPr lang="en-US" dirty="0" err="1"/>
+              <a:t>ApprovalQueue</a:t>
+            </a:r>
+            <a:r>
+              <a:rPr lang="en-US" dirty="0"/>
+              <a:t>, </a:t>
+            </a:r>
+            <a:r>
+              <a:rPr lang="en-US" dirty="0" err="1"/>
+              <a:t>PendingGoals</a:t>
+            </a:r>
+            <a:r>
+              <a:rPr lang="en-US" dirty="0"/>
+              <a:t>, </a:t>
+            </a:r>
+            <a:r>
+              <a:rPr lang="en-US" dirty="0" err="1"/>
+              <a:t>FailedGoals</a:t>
+            </a:r>
+            <a:endParaRPr lang="en-US" dirty="0"/>
           </a:p>
         </p:txBody>
       </p:sp>
@@ -10613,14 +11359,13 @@
           </a:lstStyle>
           <a:p>
             <a:r>
-              <a:rPr lang="en-US" dirty="0"/>
-              <a:t>Modified </a:t>
-            </a:r>
-            <a:r>
               <a:rPr lang="en-US" dirty="0" err="1"/>
-              <a:t>CreateDepartment</a:t>
-            </a:r>
-            <a:endParaRPr lang="en-US" dirty="0"/>
+              <a:t>ViewReport</a:t>
+            </a:r>
+            <a:r>
+              <a:rPr lang="en-US" dirty="0"/>
+              <a:t> (Department)</a:t>
+            </a:r>
           </a:p>
         </p:txBody>
       </p:sp>
@@ -10811,7 +11556,7 @@
             </a:pPr>
             <a:r>
               <a:rPr lang="en-US" dirty="0"/>
-              <a:t>Implementation</a:t>
+              <a:t>Approval Queue</a:t>
             </a:r>
           </a:p>
           <a:p>
@@ -10821,17 +11566,7 @@
             </a:pPr>
             <a:r>
               <a:rPr lang="en-US" dirty="0"/>
-              <a:t>Quarter logic – Start Date can’t be before End Date</a:t>
-            </a:r>
-          </a:p>
-          <a:p>
-            <a:pPr marL="800100" lvl="1" indent="-342900">
-              <a:buFontTx/>
-              <a:buChar char="-"/>
-            </a:pPr>
-            <a:r>
-              <a:rPr lang="en-US" dirty="0"/>
-              <a:t>Error/Exception handling</a:t>
+              <a:t>Prioritizes managed Employees’ submitted Goals</a:t>
             </a:r>
           </a:p>
         </p:txBody>
@@ -10839,7 +11574,7 @@
     </p:spTree>
     <p:extLst>
       <p:ext uri="{BB962C8B-B14F-4D97-AF65-F5344CB8AC3E}">
-        <p14:creationId xmlns:p14="http://schemas.microsoft.com/office/powerpoint/2010/main" val="1452676088"/>
+        <p14:creationId xmlns:p14="http://schemas.microsoft.com/office/powerpoint/2010/main" val="1712601127"/>
       </p:ext>
     </p:extLst>
   </p:cSld>
@@ -10904,7 +11639,7 @@
             </a:pPr>
             <a:r>
               <a:rPr lang="en-US" dirty="0"/>
-              <a:t>Removal of poor &amp; inefficient database queries</a:t>
+              <a:t>Removal of test data</a:t>
             </a:r>
           </a:p>
           <a:p>
@@ -10914,7 +11649,17 @@
             </a:pPr>
             <a:r>
               <a:rPr lang="en-US" dirty="0"/>
-              <a:t>Removal of “magic number” validation failure</a:t>
+              <a:t>Removal of unnecessary hard-coded form data</a:t>
+            </a:r>
+          </a:p>
+          <a:p>
+            <a:pPr marL="800100" lvl="1" indent="-342900">
+              <a:buFontTx/>
+              <a:buChar char="-"/>
+            </a:pPr>
+            <a:r>
+              <a:rPr lang="en-US" dirty="0"/>
+              <a:t>Correctly pulling available Supervisors to assign Dept. Supervisor</a:t>
             </a:r>
           </a:p>
         </p:txBody>
@@ -11106,16 +11851,228 @@
             </a:r>
             <a:r>
               <a:rPr lang="en-US" dirty="0" err="1"/>
-              <a:t>CreateEmployee</a:t>
+              <a:t>CreateDepartment</a:t>
             </a:r>
             <a:endParaRPr lang="en-US" dirty="0"/>
+          </a:p>
+        </p:txBody>
+      </p:sp>
+      <p:sp>
+        <p:nvSpPr>
+          <p:cNvPr id="6" name="Text Placeholder 2"/>
+          <p:cNvSpPr txBox="1">
+            <a:spLocks/>
+          </p:cNvSpPr>
+          <p:nvPr/>
+        </p:nvSpPr>
+        <p:spPr>
+          <a:xfrm>
+            <a:off x="557530" y="2906713"/>
+            <a:ext cx="10515600" cy="1500187"/>
+          </a:xfrm>
+          <a:prstGeom prst="rect">
+            <a:avLst/>
+          </a:prstGeom>
+        </p:spPr>
+        <p:txBody>
+          <a:bodyPr vert="horz" lIns="91440" tIns="45720" rIns="91440" bIns="45720" rtlCol="0">
+            <a:normAutofit/>
+          </a:bodyPr>
+          <a:lstStyle>
+            <a:lvl1pPr marL="0" indent="0" algn="l" defTabSz="228508" rtl="0" eaLnBrk="1" latinLnBrk="0" hangingPunct="1">
+              <a:spcBef>
+                <a:spcPct val="20000"/>
+              </a:spcBef>
+              <a:buFont typeface="Arial"/>
+              <a:buNone/>
+              <a:defRPr sz="2400" kern="1200">
+                <a:solidFill>
+                  <a:schemeClr val="tx1">
+                    <a:tint val="75000"/>
+                  </a:schemeClr>
+                </a:solidFill>
+                <a:latin typeface="Roboto Medium"/>
+                <a:ea typeface="+mn-ea"/>
+                <a:cs typeface="+mn-cs"/>
+              </a:defRPr>
+            </a:lvl1pPr>
+            <a:lvl2pPr marL="457200" indent="0" algn="l" defTabSz="228508" rtl="0" eaLnBrk="1" latinLnBrk="0" hangingPunct="1">
+              <a:spcBef>
+                <a:spcPct val="20000"/>
+              </a:spcBef>
+              <a:buSzPct val="60000"/>
+              <a:buFont typeface="Lucida Grande"/>
+              <a:buNone/>
+              <a:defRPr sz="2000" kern="1200">
+                <a:solidFill>
+                  <a:schemeClr val="tx1">
+                    <a:tint val="75000"/>
+                  </a:schemeClr>
+                </a:solidFill>
+                <a:latin typeface="Roboto Medium"/>
+                <a:ea typeface="+mn-ea"/>
+                <a:cs typeface="+mn-cs"/>
+              </a:defRPr>
+            </a:lvl2pPr>
+            <a:lvl3pPr marL="914400" indent="0" algn="l" defTabSz="228508" rtl="0" eaLnBrk="1" latinLnBrk="0" hangingPunct="1">
+              <a:spcBef>
+                <a:spcPct val="20000"/>
+              </a:spcBef>
+              <a:buSzPct val="60000"/>
+              <a:buFont typeface="Lucida Grande"/>
+              <a:buNone/>
+              <a:defRPr sz="1800" kern="1200">
+                <a:solidFill>
+                  <a:schemeClr val="tx1">
+                    <a:tint val="75000"/>
+                  </a:schemeClr>
+                </a:solidFill>
+                <a:latin typeface="Roboto Medium"/>
+                <a:ea typeface="+mn-ea"/>
+                <a:cs typeface="+mn-cs"/>
+              </a:defRPr>
+            </a:lvl3pPr>
+            <a:lvl4pPr marL="1371600" indent="0" algn="l" defTabSz="228508" rtl="0" eaLnBrk="1" latinLnBrk="0" hangingPunct="1">
+              <a:spcBef>
+                <a:spcPct val="20000"/>
+              </a:spcBef>
+              <a:buSzPct val="60000"/>
+              <a:buFont typeface="Lucida Grande"/>
+              <a:buNone/>
+              <a:defRPr sz="1600" kern="1200">
+                <a:solidFill>
+                  <a:schemeClr val="tx1">
+                    <a:tint val="75000"/>
+                  </a:schemeClr>
+                </a:solidFill>
+                <a:latin typeface="Roboto Medium"/>
+                <a:ea typeface="+mn-ea"/>
+                <a:cs typeface="+mn-cs"/>
+              </a:defRPr>
+            </a:lvl4pPr>
+            <a:lvl5pPr marL="1828800" indent="0" algn="l" defTabSz="228508" rtl="0" eaLnBrk="1" latinLnBrk="0" hangingPunct="1">
+              <a:spcBef>
+                <a:spcPct val="20000"/>
+              </a:spcBef>
+              <a:buSzPct val="60000"/>
+              <a:buFont typeface="Lucida Grande"/>
+              <a:buNone/>
+              <a:defRPr sz="1600" kern="1200">
+                <a:solidFill>
+                  <a:schemeClr val="tx1">
+                    <a:tint val="75000"/>
+                  </a:schemeClr>
+                </a:solidFill>
+                <a:latin typeface="Roboto Medium"/>
+                <a:ea typeface="+mn-ea"/>
+                <a:cs typeface="+mn-cs"/>
+              </a:defRPr>
+            </a:lvl5pPr>
+            <a:lvl6pPr marL="2286000" indent="0" algn="l" defTabSz="228508" rtl="0" eaLnBrk="1" latinLnBrk="0" hangingPunct="1">
+              <a:spcBef>
+                <a:spcPct val="20000"/>
+              </a:spcBef>
+              <a:buFont typeface="Arial"/>
+              <a:buNone/>
+              <a:defRPr sz="1600" kern="1200">
+                <a:solidFill>
+                  <a:schemeClr val="tx1">
+                    <a:tint val="75000"/>
+                  </a:schemeClr>
+                </a:solidFill>
+                <a:latin typeface="+mn-lt"/>
+                <a:ea typeface="+mn-ea"/>
+                <a:cs typeface="+mn-cs"/>
+              </a:defRPr>
+            </a:lvl6pPr>
+            <a:lvl7pPr marL="2743200" indent="0" algn="l" defTabSz="228508" rtl="0" eaLnBrk="1" latinLnBrk="0" hangingPunct="1">
+              <a:spcBef>
+                <a:spcPct val="20000"/>
+              </a:spcBef>
+              <a:buFont typeface="Arial"/>
+              <a:buNone/>
+              <a:defRPr sz="1600" kern="1200">
+                <a:solidFill>
+                  <a:schemeClr val="tx1">
+                    <a:tint val="75000"/>
+                  </a:schemeClr>
+                </a:solidFill>
+                <a:latin typeface="+mn-lt"/>
+                <a:ea typeface="+mn-ea"/>
+                <a:cs typeface="+mn-cs"/>
+              </a:defRPr>
+            </a:lvl7pPr>
+            <a:lvl8pPr marL="3200400" indent="0" algn="l" defTabSz="228508" rtl="0" eaLnBrk="1" latinLnBrk="0" hangingPunct="1">
+              <a:spcBef>
+                <a:spcPct val="20000"/>
+              </a:spcBef>
+              <a:buFont typeface="Arial"/>
+              <a:buNone/>
+              <a:defRPr sz="1600" kern="1200">
+                <a:solidFill>
+                  <a:schemeClr val="tx1">
+                    <a:tint val="75000"/>
+                  </a:schemeClr>
+                </a:solidFill>
+                <a:latin typeface="+mn-lt"/>
+                <a:ea typeface="+mn-ea"/>
+                <a:cs typeface="+mn-cs"/>
+              </a:defRPr>
+            </a:lvl8pPr>
+            <a:lvl9pPr marL="3657600" indent="0" algn="l" defTabSz="228508" rtl="0" eaLnBrk="1" latinLnBrk="0" hangingPunct="1">
+              <a:spcBef>
+                <a:spcPct val="20000"/>
+              </a:spcBef>
+              <a:buFont typeface="Arial"/>
+              <a:buNone/>
+              <a:defRPr sz="1600" kern="1200">
+                <a:solidFill>
+                  <a:schemeClr val="tx1">
+                    <a:tint val="75000"/>
+                  </a:schemeClr>
+                </a:solidFill>
+                <a:latin typeface="+mn-lt"/>
+                <a:ea typeface="+mn-ea"/>
+                <a:cs typeface="+mn-cs"/>
+              </a:defRPr>
+            </a:lvl9pPr>
+          </a:lstStyle>
+          <a:p>
+            <a:pPr marL="342900" indent="-342900">
+              <a:buFontTx/>
+              <a:buChar char="-"/>
+            </a:pPr>
+            <a:r>
+              <a:rPr lang="en-US" dirty="0"/>
+              <a:t>Implementation</a:t>
+            </a:r>
+          </a:p>
+          <a:p>
+            <a:pPr marL="800100" lvl="1" indent="-342900">
+              <a:buFontTx/>
+              <a:buChar char="-"/>
+            </a:pPr>
+            <a:r>
+              <a:rPr lang="en-US" dirty="0"/>
+              <a:t>Quarter logic – Start Date can’t be before End Date</a:t>
+            </a:r>
+          </a:p>
+          <a:p>
+            <a:pPr marL="800100" lvl="1" indent="-342900">
+              <a:buFontTx/>
+              <a:buChar char="-"/>
+            </a:pPr>
+            <a:r>
+              <a:rPr lang="en-US" dirty="0"/>
+              <a:t>Error/Exception handling</a:t>
+            </a:r>
           </a:p>
         </p:txBody>
       </p:sp>
     </p:spTree>
     <p:extLst>
       <p:ext uri="{BB962C8B-B14F-4D97-AF65-F5344CB8AC3E}">
-        <p14:creationId xmlns:p14="http://schemas.microsoft.com/office/powerpoint/2010/main" val="2288731273"/>
+        <p14:creationId xmlns:p14="http://schemas.microsoft.com/office/powerpoint/2010/main" val="1452676088"/>
       </p:ext>
     </p:extLst>
   </p:cSld>

</xml_diff>